<commit_message>
Final calibration before sharing
</commit_message>
<xml_diff>
--- a/documentation/interim/Transmission Model Baseline.pptx
+++ b/documentation/interim/Transmission Model Baseline.pptx
@@ -11,6 +11,7 @@
     <p:sldId id="259" r:id="rId5"/>
     <p:sldId id="260" r:id="rId6"/>
     <p:sldId id="261" r:id="rId7"/>
+    <p:sldId id="262" r:id="rId8"/>
   </p:sldIdLst>
   <p:sldSz cx="12192000" cy="6858000"/>
   <p:notesSz cx="6858000" cy="9144000"/>
@@ -109,6 +110,11 @@
       </a:defRPr>
     </a:lvl9pPr>
   </p:defaultTextStyle>
+  <p:extLst>
+    <p:ext uri="{EFAFB233-063F-42B5-8137-9DF3F51BA10A}">
+      <p15:sldGuideLst xmlns:p15="http://schemas.microsoft.com/office/powerpoint/2012/main"/>
+    </p:ext>
+  </p:extLst>
 </p:presentation>
 </file>
 
@@ -259,7 +265,7 @@
           <a:p>
             <a:fld id="{08C1035D-8CA6-4748-93CD-5DDB1972CCBE}" type="datetimeFigureOut">
               <a:rPr lang="en-GB" smtClean="0"/>
-              <a:t>25/03/2024</a:t>
+              <a:t>25/04/2024</a:t>
             </a:fld>
             <a:endParaRPr lang="en-GB"/>
           </a:p>
@@ -457,7 +463,7 @@
           <a:p>
             <a:fld id="{08C1035D-8CA6-4748-93CD-5DDB1972CCBE}" type="datetimeFigureOut">
               <a:rPr lang="en-GB" smtClean="0"/>
-              <a:t>25/03/2024</a:t>
+              <a:t>25/04/2024</a:t>
             </a:fld>
             <a:endParaRPr lang="en-GB"/>
           </a:p>
@@ -665,7 +671,7 @@
           <a:p>
             <a:fld id="{08C1035D-8CA6-4748-93CD-5DDB1972CCBE}" type="datetimeFigureOut">
               <a:rPr lang="en-GB" smtClean="0"/>
-              <a:t>25/03/2024</a:t>
+              <a:t>25/04/2024</a:t>
             </a:fld>
             <a:endParaRPr lang="en-GB"/>
           </a:p>
@@ -863,7 +869,7 @@
           <a:p>
             <a:fld id="{08C1035D-8CA6-4748-93CD-5DDB1972CCBE}" type="datetimeFigureOut">
               <a:rPr lang="en-GB" smtClean="0"/>
-              <a:t>25/03/2024</a:t>
+              <a:t>25/04/2024</a:t>
             </a:fld>
             <a:endParaRPr lang="en-GB"/>
           </a:p>
@@ -1138,7 +1144,7 @@
           <a:p>
             <a:fld id="{08C1035D-8CA6-4748-93CD-5DDB1972CCBE}" type="datetimeFigureOut">
               <a:rPr lang="en-GB" smtClean="0"/>
-              <a:t>25/03/2024</a:t>
+              <a:t>25/04/2024</a:t>
             </a:fld>
             <a:endParaRPr lang="en-GB"/>
           </a:p>
@@ -1403,7 +1409,7 @@
           <a:p>
             <a:fld id="{08C1035D-8CA6-4748-93CD-5DDB1972CCBE}" type="datetimeFigureOut">
               <a:rPr lang="en-GB" smtClean="0"/>
-              <a:t>25/03/2024</a:t>
+              <a:t>25/04/2024</a:t>
             </a:fld>
             <a:endParaRPr lang="en-GB"/>
           </a:p>
@@ -1815,7 +1821,7 @@
           <a:p>
             <a:fld id="{08C1035D-8CA6-4748-93CD-5DDB1972CCBE}" type="datetimeFigureOut">
               <a:rPr lang="en-GB" smtClean="0"/>
-              <a:t>25/03/2024</a:t>
+              <a:t>25/04/2024</a:t>
             </a:fld>
             <a:endParaRPr lang="en-GB"/>
           </a:p>
@@ -1956,7 +1962,7 @@
           <a:p>
             <a:fld id="{08C1035D-8CA6-4748-93CD-5DDB1972CCBE}" type="datetimeFigureOut">
               <a:rPr lang="en-GB" smtClean="0"/>
-              <a:t>25/03/2024</a:t>
+              <a:t>25/04/2024</a:t>
             </a:fld>
             <a:endParaRPr lang="en-GB"/>
           </a:p>
@@ -2069,7 +2075,7 @@
           <a:p>
             <a:fld id="{08C1035D-8CA6-4748-93CD-5DDB1972CCBE}" type="datetimeFigureOut">
               <a:rPr lang="en-GB" smtClean="0"/>
-              <a:t>25/03/2024</a:t>
+              <a:t>25/04/2024</a:t>
             </a:fld>
             <a:endParaRPr lang="en-GB"/>
           </a:p>
@@ -2380,7 +2386,7 @@
           <a:p>
             <a:fld id="{08C1035D-8CA6-4748-93CD-5DDB1972CCBE}" type="datetimeFigureOut">
               <a:rPr lang="en-GB" smtClean="0"/>
-              <a:t>25/03/2024</a:t>
+              <a:t>25/04/2024</a:t>
             </a:fld>
             <a:endParaRPr lang="en-GB"/>
           </a:p>
@@ -2668,7 +2674,7 @@
           <a:p>
             <a:fld id="{08C1035D-8CA6-4748-93CD-5DDB1972CCBE}" type="datetimeFigureOut">
               <a:rPr lang="en-GB" smtClean="0"/>
-              <a:t>25/03/2024</a:t>
+              <a:t>25/04/2024</a:t>
             </a:fld>
             <a:endParaRPr lang="en-GB"/>
           </a:p>
@@ -2909,7 +2915,7 @@
           <a:p>
             <a:fld id="{08C1035D-8CA6-4748-93CD-5DDB1972CCBE}" type="datetimeFigureOut">
               <a:rPr lang="en-GB" smtClean="0"/>
-              <a:t>25/03/2024</a:t>
+              <a:t>25/04/2024</a:t>
             </a:fld>
             <a:endParaRPr lang="en-GB"/>
           </a:p>
@@ -3409,12 +3415,40 @@
           <a:chExt cx="0" cy="0"/>
         </a:xfrm>
       </p:grpSpPr>
+      <p:sp>
+        <p:nvSpPr>
+          <p:cNvPr id="5" name="Title 4">
+            <a:extLst>
+              <a:ext uri="{FF2B5EF4-FFF2-40B4-BE49-F238E27FC236}">
+                <a16:creationId xmlns:a16="http://schemas.microsoft.com/office/drawing/2014/main" id="{CE53EC7C-277C-F0F1-0102-22CF2E87EDC4}"/>
+              </a:ext>
+            </a:extLst>
+          </p:cNvPr>
+          <p:cNvSpPr>
+            <a:spLocks noGrp="1"/>
+          </p:cNvSpPr>
+          <p:nvPr>
+            <p:ph type="title"/>
+          </p:nvPr>
+        </p:nvSpPr>
+        <p:spPr/>
+        <p:txBody>
+          <a:bodyPr/>
+          <a:lstStyle/>
+          <a:p>
+            <a:r>
+              <a:rPr lang="en-GB" dirty="0"/>
+              <a:t>Baseline SFD</a:t>
+            </a:r>
+          </a:p>
+        </p:txBody>
+      </p:sp>
       <p:pic>
         <p:nvPicPr>
-          <p:cNvPr id="4" name="Picture 3">
-            <a:extLst>
-              <a:ext uri="{FF2B5EF4-FFF2-40B4-BE49-F238E27FC236}">
-                <a16:creationId xmlns:a16="http://schemas.microsoft.com/office/drawing/2014/main" id="{4E824581-D73E-185E-676E-F3DFE06C180C}"/>
+          <p:cNvPr id="6" name="Picture 5">
+            <a:extLst>
+              <a:ext uri="{FF2B5EF4-FFF2-40B4-BE49-F238E27FC236}">
+                <a16:creationId xmlns:a16="http://schemas.microsoft.com/office/drawing/2014/main" id="{DB24B349-9746-C862-523A-0E12AF856154}"/>
               </a:ext>
             </a:extLst>
           </p:cNvPr>
@@ -3423,49 +3457,22 @@
           </p:cNvPicPr>
           <p:nvPr/>
         </p:nvPicPr>
-        <p:blipFill rotWithShape="1">
+        <p:blipFill>
           <a:blip r:embed="rId2"/>
-          <a:srcRect l="2870" t="2496" r="1066"/>
-          <a:stretch/>
+          <a:stretch>
+            <a:fillRect/>
+          </a:stretch>
         </p:blipFill>
         <p:spPr>
           <a:xfrm>
-            <a:off x="89875" y="1569310"/>
-            <a:ext cx="12102125" cy="5288690"/>
+            <a:off x="436417" y="1407288"/>
+            <a:ext cx="11331743" cy="5450711"/>
           </a:xfrm>
           <a:prstGeom prst="rect">
             <a:avLst/>
           </a:prstGeom>
         </p:spPr>
       </p:pic>
-      <p:sp>
-        <p:nvSpPr>
-          <p:cNvPr id="5" name="Title 4">
-            <a:extLst>
-              <a:ext uri="{FF2B5EF4-FFF2-40B4-BE49-F238E27FC236}">
-                <a16:creationId xmlns:a16="http://schemas.microsoft.com/office/drawing/2014/main" id="{CE53EC7C-277C-F0F1-0102-22CF2E87EDC4}"/>
-              </a:ext>
-            </a:extLst>
-          </p:cNvPr>
-          <p:cNvSpPr>
-            <a:spLocks noGrp="1"/>
-          </p:cNvSpPr>
-          <p:nvPr>
-            <p:ph type="title"/>
-          </p:nvPr>
-        </p:nvSpPr>
-        <p:spPr/>
-        <p:txBody>
-          <a:bodyPr/>
-          <a:lstStyle/>
-          <a:p>
-            <a:r>
-              <a:rPr lang="en-GB" dirty="0"/>
-              <a:t>Baseline SFD</a:t>
-            </a:r>
-          </a:p>
-        </p:txBody>
-      </p:sp>
     </p:spTree>
     <p:extLst>
       <p:ext uri="{BB962C8B-B14F-4D97-AF65-F5344CB8AC3E}">
@@ -3512,7 +3519,12 @@
             <p:ph type="title"/>
           </p:nvPr>
         </p:nvSpPr>
-        <p:spPr/>
+        <p:spPr>
+          <a:xfrm>
+            <a:off x="751703" y="66783"/>
+            <a:ext cx="10515600" cy="1325563"/>
+          </a:xfrm>
+        </p:spPr>
         <p:txBody>
           <a:bodyPr/>
           <a:lstStyle/>
@@ -3524,536 +3536,65 @@
           </a:p>
         </p:txBody>
       </p:sp>
-      <p:graphicFrame>
-        <p:nvGraphicFramePr>
-          <p:cNvPr id="4" name="Table 3">
-            <a:extLst>
-              <a:ext uri="{FF2B5EF4-FFF2-40B4-BE49-F238E27FC236}">
-                <a16:creationId xmlns:a16="http://schemas.microsoft.com/office/drawing/2014/main" id="{56C9D29A-021B-7DA4-A50B-CDE300DC842F}"/>
-              </a:ext>
-            </a:extLst>
-          </p:cNvPr>
-          <p:cNvGraphicFramePr>
-            <a:graphicFrameLocks noGrp="1"/>
-          </p:cNvGraphicFramePr>
-          <p:nvPr>
-            <p:extLst>
-              <p:ext uri="{D42A27DB-BD31-4B8C-83A1-F6EECF244321}">
-                <p14:modId xmlns:p14="http://schemas.microsoft.com/office/powerpoint/2010/main" val="2729082820"/>
-              </p:ext>
-            </p:extLst>
-          </p:nvPr>
-        </p:nvGraphicFramePr>
-        <p:xfrm>
-          <a:off x="236483" y="1677035"/>
-          <a:ext cx="6505903" cy="4815840"/>
-        </p:xfrm>
-        <a:graphic>
-          <a:graphicData uri="http://schemas.openxmlformats.org/drawingml/2006/table">
-            <a:tbl>
-              <a:tblPr firstRow="1" bandRow="1">
-                <a:tableStyleId>{5C22544A-7EE6-4342-B048-85BDC9FD1C3A}</a:tableStyleId>
-              </a:tblPr>
-              <a:tblGrid>
-                <a:gridCol w="1201706">
-                  <a:extLst>
-                    <a:ext uri="{9D8B030D-6E8A-4147-A177-3AD203B41FA5}">
-                      <a16:colId xmlns:a16="http://schemas.microsoft.com/office/drawing/2014/main" val="1006006788"/>
-                    </a:ext>
-                  </a:extLst>
-                </a:gridCol>
-                <a:gridCol w="2666101">
-                  <a:extLst>
-                    <a:ext uri="{9D8B030D-6E8A-4147-A177-3AD203B41FA5}">
-                      <a16:colId xmlns:a16="http://schemas.microsoft.com/office/drawing/2014/main" val="2665606912"/>
-                    </a:ext>
-                  </a:extLst>
-                </a:gridCol>
-                <a:gridCol w="1513490">
-                  <a:extLst>
-                    <a:ext uri="{9D8B030D-6E8A-4147-A177-3AD203B41FA5}">
-                      <a16:colId xmlns:a16="http://schemas.microsoft.com/office/drawing/2014/main" val="705433518"/>
-                    </a:ext>
-                  </a:extLst>
-                </a:gridCol>
-                <a:gridCol w="1124606">
-                  <a:extLst>
-                    <a:ext uri="{9D8B030D-6E8A-4147-A177-3AD203B41FA5}">
-                      <a16:colId xmlns:a16="http://schemas.microsoft.com/office/drawing/2014/main" val="1631359333"/>
-                    </a:ext>
-                  </a:extLst>
-                </a:gridCol>
-              </a:tblGrid>
-              <a:tr h="379375">
-                <a:tc>
-                  <a:txBody>
-                    <a:bodyPr/>
-                    <a:lstStyle/>
-                    <a:p>
-                      <a:r>
-                        <a:rPr lang="en-GB" sz="1400" dirty="0"/>
-                        <a:t>Parameter</a:t>
-                      </a:r>
-                    </a:p>
-                  </a:txBody>
-                  <a:tcPr/>
-                </a:tc>
-                <a:tc>
-                  <a:txBody>
-                    <a:bodyPr/>
-                    <a:lstStyle/>
-                    <a:p>
-                      <a:r>
-                        <a:rPr lang="en-GB" sz="1400" dirty="0"/>
-                        <a:t>Description</a:t>
-                      </a:r>
-                    </a:p>
-                  </a:txBody>
-                  <a:tcPr/>
-                </a:tc>
-                <a:tc>
-                  <a:txBody>
-                    <a:bodyPr/>
-                    <a:lstStyle/>
-                    <a:p>
-                      <a:r>
-                        <a:rPr lang="en-GB" sz="1400" dirty="0"/>
-                        <a:t>Initial guess and calibration Range</a:t>
-                      </a:r>
-                    </a:p>
-                  </a:txBody>
-                  <a:tcPr/>
-                </a:tc>
-                <a:tc>
-                  <a:txBody>
-                    <a:bodyPr/>
-                    <a:lstStyle/>
-                    <a:p>
-                      <a:r>
-                        <a:rPr lang="en-GB" sz="1400" dirty="0"/>
-                        <a:t>Calibration Result</a:t>
-                      </a:r>
-                    </a:p>
-                  </a:txBody>
-                  <a:tcPr/>
-                </a:tc>
-                <a:extLst>
-                  <a:ext uri="{0D108BD9-81ED-4DB2-BD59-A6C34878D82A}">
-                    <a16:rowId xmlns:a16="http://schemas.microsoft.com/office/drawing/2014/main" val="4118099167"/>
-                  </a:ext>
-                </a:extLst>
-              </a:tr>
-              <a:tr h="338708">
-                <a:tc>
-                  <a:txBody>
-                    <a:bodyPr/>
-                    <a:lstStyle/>
-                    <a:p>
-                      <a:r>
-                        <a:rPr lang="en-GB" sz="1400" dirty="0"/>
-                        <a:t>Transmission Rate</a:t>
-                      </a:r>
-                    </a:p>
-                  </a:txBody>
-                  <a:tcPr/>
-                </a:tc>
-                <a:tc>
-                  <a:txBody>
-                    <a:bodyPr/>
-                    <a:lstStyle/>
-                    <a:p>
-                      <a:r>
-                        <a:rPr lang="en-GB" sz="1400" dirty="0"/>
-                        <a:t>Rate at which a susceptible individual may interact with and be infected by an individual with TB</a:t>
-                      </a:r>
-                    </a:p>
-                  </a:txBody>
-                  <a:tcPr/>
-                </a:tc>
-                <a:tc>
-                  <a:txBody>
-                    <a:bodyPr/>
-                    <a:lstStyle/>
-                    <a:p>
-                      <a:r>
-                        <a:rPr lang="en-GB" sz="1400" dirty="0"/>
-                        <a:t>0.05</a:t>
-                      </a:r>
-                    </a:p>
-                    <a:p>
-                      <a:r>
-                        <a:rPr lang="en-GB" sz="1400" dirty="0"/>
-                        <a:t>(0,0.1)</a:t>
-                      </a:r>
-                    </a:p>
-                  </a:txBody>
-                  <a:tcPr/>
-                </a:tc>
-                <a:tc>
-                  <a:txBody>
-                    <a:bodyPr/>
-                    <a:lstStyle/>
-                    <a:p>
-                      <a:r>
-                        <a:rPr lang="en-GB" sz="1400" dirty="0"/>
-                        <a:t>0.06356</a:t>
-                      </a:r>
-                    </a:p>
-                  </a:txBody>
-                  <a:tcPr/>
-                </a:tc>
-                <a:extLst>
-                  <a:ext uri="{0D108BD9-81ED-4DB2-BD59-A6C34878D82A}">
-                    <a16:rowId xmlns:a16="http://schemas.microsoft.com/office/drawing/2014/main" val="1791913784"/>
-                  </a:ext>
-                </a:extLst>
-              </a:tr>
-              <a:tr h="338708">
-                <a:tc>
-                  <a:txBody>
-                    <a:bodyPr/>
-                    <a:lstStyle/>
-                    <a:p>
-                      <a:r>
-                        <a:rPr lang="en-GB" sz="1400" dirty="0"/>
-                        <a:t>Relapse Rate</a:t>
-                      </a:r>
-                    </a:p>
-                  </a:txBody>
-                  <a:tcPr/>
-                </a:tc>
-                <a:tc>
-                  <a:txBody>
-                    <a:bodyPr/>
-                    <a:lstStyle/>
-                    <a:p>
-                      <a:r>
-                        <a:rPr lang="en-GB" sz="1400" dirty="0"/>
-                        <a:t>Rate at which a person who has previously been treated with TB experiences diseases reactivation</a:t>
-                      </a:r>
-                    </a:p>
-                  </a:txBody>
-                  <a:tcPr/>
-                </a:tc>
-                <a:tc>
-                  <a:txBody>
-                    <a:bodyPr/>
-                    <a:lstStyle/>
-                    <a:p>
-                      <a:r>
-                        <a:rPr lang="en-GB" sz="1400" dirty="0"/>
-                        <a:t>0.1</a:t>
-                      </a:r>
-                    </a:p>
-                    <a:p>
-                      <a:r>
-                        <a:rPr lang="en-GB" sz="1400" dirty="0"/>
-                        <a:t>(0.004,0.1)</a:t>
-                      </a:r>
-                    </a:p>
-                  </a:txBody>
-                  <a:tcPr/>
-                </a:tc>
-                <a:tc>
-                  <a:txBody>
-                    <a:bodyPr/>
-                    <a:lstStyle/>
-                    <a:p>
-                      <a:r>
-                        <a:rPr lang="en-GB" sz="1400" dirty="0"/>
-                        <a:t>0.0083138</a:t>
-                      </a:r>
-                    </a:p>
-                  </a:txBody>
-                  <a:tcPr/>
-                </a:tc>
-                <a:extLst>
-                  <a:ext uri="{0D108BD9-81ED-4DB2-BD59-A6C34878D82A}">
-                    <a16:rowId xmlns:a16="http://schemas.microsoft.com/office/drawing/2014/main" val="4090738007"/>
-                  </a:ext>
-                </a:extLst>
-              </a:tr>
-              <a:tr h="338708">
-                <a:tc>
-                  <a:txBody>
-                    <a:bodyPr/>
-                    <a:lstStyle/>
-                    <a:p>
-                      <a:r>
-                        <a:rPr lang="en-GB" sz="1400" dirty="0"/>
-                        <a:t>Initial incident</a:t>
-                      </a:r>
-                    </a:p>
-                  </a:txBody>
-                  <a:tcPr/>
-                </a:tc>
-                <a:tc>
-                  <a:txBody>
-                    <a:bodyPr/>
-                    <a:lstStyle/>
-                    <a:p>
-                      <a:r>
-                        <a:rPr lang="en-GB" sz="1400" dirty="0"/>
-                        <a:t>The starting  number of individuals with  active TB in the model</a:t>
-                      </a:r>
-                    </a:p>
-                  </a:txBody>
-                  <a:tcPr/>
-                </a:tc>
-                <a:tc>
-                  <a:txBody>
-                    <a:bodyPr/>
-                    <a:lstStyle/>
-                    <a:p>
-                      <a:r>
-                        <a:rPr lang="en-GB" sz="1400" dirty="0"/>
-                        <a:t>100 000</a:t>
-                      </a:r>
-                    </a:p>
-                    <a:p>
-                      <a:r>
-                        <a:rPr lang="en-GB" sz="1400" dirty="0"/>
-                        <a:t>(1, 3 000 000)</a:t>
-                      </a:r>
-                    </a:p>
-                  </a:txBody>
-                  <a:tcPr/>
-                </a:tc>
-                <a:tc>
-                  <a:txBody>
-                    <a:bodyPr/>
-                    <a:lstStyle/>
-                    <a:p>
-                      <a:r>
-                        <a:rPr lang="en-GB" sz="1400" dirty="0"/>
-                        <a:t>1 903 068</a:t>
-                      </a:r>
-                    </a:p>
-                  </a:txBody>
-                  <a:tcPr/>
-                </a:tc>
-                <a:extLst>
-                  <a:ext uri="{0D108BD9-81ED-4DB2-BD59-A6C34878D82A}">
-                    <a16:rowId xmlns:a16="http://schemas.microsoft.com/office/drawing/2014/main" val="3035358814"/>
-                  </a:ext>
-                </a:extLst>
-              </a:tr>
-              <a:tr h="338708">
-                <a:tc>
-                  <a:txBody>
-                    <a:bodyPr/>
-                    <a:lstStyle/>
-                    <a:p>
-                      <a:r>
-                        <a:rPr lang="en-GB" sz="1400" dirty="0"/>
-                        <a:t>Progression rate</a:t>
-                      </a:r>
-                    </a:p>
-                  </a:txBody>
-                  <a:tcPr/>
-                </a:tc>
-                <a:tc>
-                  <a:txBody>
-                    <a:bodyPr/>
-                    <a:lstStyle/>
-                    <a:p>
-                      <a:r>
-                        <a:rPr lang="en-GB" sz="1400" dirty="0"/>
-                        <a:t>The rate at which an individual with latent TB moves to having active TB</a:t>
-                      </a:r>
-                    </a:p>
-                  </a:txBody>
-                  <a:tcPr/>
-                </a:tc>
-                <a:tc>
-                  <a:txBody>
-                    <a:bodyPr/>
-                    <a:lstStyle/>
-                    <a:p>
-                      <a:r>
-                        <a:rPr lang="en-GB" sz="1400" dirty="0"/>
-                        <a:t>0.08</a:t>
-                      </a:r>
-                    </a:p>
-                    <a:p>
-                      <a:r>
-                        <a:rPr lang="en-GB" sz="1400" dirty="0"/>
-                        <a:t>(0,0.2)</a:t>
-                      </a:r>
-                    </a:p>
-                  </a:txBody>
-                  <a:tcPr/>
-                </a:tc>
-                <a:tc>
-                  <a:txBody>
-                    <a:bodyPr/>
-                    <a:lstStyle/>
-                    <a:p>
-                      <a:r>
-                        <a:rPr lang="en-GB" sz="1400" dirty="0"/>
-                        <a:t>0.09566</a:t>
-                      </a:r>
-                    </a:p>
-                  </a:txBody>
-                  <a:tcPr/>
-                </a:tc>
-                <a:extLst>
-                  <a:ext uri="{0D108BD9-81ED-4DB2-BD59-A6C34878D82A}">
-                    <a16:rowId xmlns:a16="http://schemas.microsoft.com/office/drawing/2014/main" val="3980972728"/>
-                  </a:ext>
-                </a:extLst>
-              </a:tr>
-              <a:tr h="338708">
-                <a:tc>
-                  <a:txBody>
-                    <a:bodyPr/>
-                    <a:lstStyle/>
-                    <a:p>
-                      <a:r>
-                        <a:rPr lang="en-GB" sz="1400" dirty="0"/>
-                        <a:t>Initial latent</a:t>
-                      </a:r>
-                    </a:p>
-                  </a:txBody>
-                  <a:tcPr/>
-                </a:tc>
-                <a:tc>
-                  <a:txBody>
-                    <a:bodyPr/>
-                    <a:lstStyle/>
-                    <a:p>
-                      <a:r>
-                        <a:rPr lang="en-GB" sz="1400" dirty="0"/>
-                        <a:t>The starting number of individuals with latent TB in the model</a:t>
-                      </a:r>
-                    </a:p>
-                  </a:txBody>
-                  <a:tcPr/>
-                </a:tc>
-                <a:tc>
-                  <a:txBody>
-                    <a:bodyPr/>
-                    <a:lstStyle/>
-                    <a:p>
-                      <a:r>
-                        <a:rPr lang="en-GB" sz="1400" dirty="0"/>
-                        <a:t>100 000</a:t>
-                      </a:r>
-                    </a:p>
-                    <a:p>
-                      <a:r>
-                        <a:rPr lang="en-GB" sz="1400" dirty="0"/>
-                        <a:t>(1, 3 000 000)</a:t>
-                      </a:r>
-                    </a:p>
-                  </a:txBody>
-                  <a:tcPr/>
-                </a:tc>
-                <a:tc>
-                  <a:txBody>
-                    <a:bodyPr/>
-                    <a:lstStyle/>
-                    <a:p>
-                      <a:r>
-                        <a:rPr lang="en-GB" sz="1400" dirty="0"/>
-                        <a:t>1 732 038</a:t>
-                      </a:r>
-                    </a:p>
-                  </a:txBody>
-                  <a:tcPr/>
-                </a:tc>
-                <a:extLst>
-                  <a:ext uri="{0D108BD9-81ED-4DB2-BD59-A6C34878D82A}">
-                    <a16:rowId xmlns:a16="http://schemas.microsoft.com/office/drawing/2014/main" val="2332845350"/>
-                  </a:ext>
-                </a:extLst>
-              </a:tr>
-            </a:tbl>
-          </a:graphicData>
-        </a:graphic>
-      </p:graphicFrame>
       <p:pic>
         <p:nvPicPr>
-          <p:cNvPr id="1026" name="Picture 2">
-            <a:extLst>
-              <a:ext uri="{FF2B5EF4-FFF2-40B4-BE49-F238E27FC236}">
-                <a16:creationId xmlns:a16="http://schemas.microsoft.com/office/drawing/2014/main" id="{3ECE8D5B-8ADF-1EB3-4EDF-EA2785EC8FDD}"/>
+          <p:cNvPr id="6" name="Picture 5">
+            <a:extLst>
+              <a:ext uri="{FF2B5EF4-FFF2-40B4-BE49-F238E27FC236}">
+                <a16:creationId xmlns:a16="http://schemas.microsoft.com/office/drawing/2014/main" id="{E68A790B-E88F-9B8D-9650-4659DBADC437}"/>
               </a:ext>
             </a:extLst>
           </p:cNvPr>
           <p:cNvPicPr>
-            <a:picLocks noChangeAspect="1" noChangeArrowheads="1"/>
+            <a:picLocks noChangeAspect="1"/>
           </p:cNvPicPr>
           <p:nvPr/>
         </p:nvPicPr>
         <p:blipFill>
-          <a:blip r:embed="rId2">
-            <a:extLst>
-              <a:ext uri="{28A0092B-C50C-407E-A947-70E740481C1C}">
-                <a14:useLocalDpi xmlns:a14="http://schemas.microsoft.com/office/drawing/2010/main" val="0"/>
-              </a:ext>
-            </a:extLst>
-          </a:blip>
+          <a:blip r:embed="rId2"/>
           <a:srcRect/>
+          <a:stretch/>
+        </p:blipFill>
+        <p:spPr>
+          <a:xfrm>
+            <a:off x="6742386" y="1826500"/>
+            <a:ext cx="5181600" cy="3530600"/>
+          </a:xfrm>
+          <a:prstGeom prst="rect">
+            <a:avLst/>
+          </a:prstGeom>
+        </p:spPr>
+      </p:pic>
+      <p:pic>
+        <p:nvPicPr>
+          <p:cNvPr id="8" name="Picture 7">
+            <a:extLst>
+              <a:ext uri="{FF2B5EF4-FFF2-40B4-BE49-F238E27FC236}">
+                <a16:creationId xmlns:a16="http://schemas.microsoft.com/office/drawing/2014/main" id="{0F858B4C-6771-1355-1D5A-967E98AFFFF2}"/>
+              </a:ext>
+            </a:extLst>
+          </p:cNvPr>
+          <p:cNvPicPr>
+            <a:picLocks noChangeAspect="1"/>
+          </p:cNvPicPr>
+          <p:nvPr/>
+        </p:nvPicPr>
+        <p:blipFill>
+          <a:blip r:embed="rId3"/>
           <a:stretch>
             <a:fillRect/>
           </a:stretch>
         </p:blipFill>
-        <p:spPr bwMode="auto">
+        <p:spPr>
           <a:xfrm>
-            <a:off x="6742386" y="2107860"/>
-            <a:ext cx="5312980" cy="3620119"/>
+            <a:off x="268014" y="1954650"/>
+            <a:ext cx="6620666" cy="2948700"/>
           </a:xfrm>
           <a:prstGeom prst="rect">
             <a:avLst/>
           </a:prstGeom>
-          <a:noFill/>
-          <a:extLst>
-            <a:ext uri="{909E8E84-426E-40DD-AFC4-6F175D3DCCD1}">
-              <a14:hiddenFill xmlns:a14="http://schemas.microsoft.com/office/drawing/2010/main">
-                <a:solidFill>
-                  <a:srgbClr val="FFFFFF"/>
-                </a:solidFill>
-              </a14:hiddenFill>
-            </a:ext>
-          </a:extLst>
         </p:spPr>
       </p:pic>
-      <p:sp>
-        <p:nvSpPr>
-          <p:cNvPr id="6" name="TextBox 5">
-            <a:extLst>
-              <a:ext uri="{FF2B5EF4-FFF2-40B4-BE49-F238E27FC236}">
-                <a16:creationId xmlns:a16="http://schemas.microsoft.com/office/drawing/2014/main" id="{03E917C8-8D40-FCE1-5304-9229D56C170C}"/>
-              </a:ext>
-            </a:extLst>
-          </p:cNvPr>
-          <p:cNvSpPr txBox="1"/>
-          <p:nvPr/>
-        </p:nvSpPr>
-        <p:spPr>
-          <a:xfrm>
-            <a:off x="7731860" y="6145151"/>
-            <a:ext cx="4223657" cy="369332"/>
-          </a:xfrm>
-          <a:prstGeom prst="rect">
-            <a:avLst/>
-          </a:prstGeom>
-          <a:noFill/>
-        </p:spPr>
-        <p:txBody>
-          <a:bodyPr wrap="square" rtlCol="0">
-            <a:spAutoFit/>
-          </a:bodyPr>
-          <a:lstStyle/>
-          <a:p>
-            <a:r>
-              <a:rPr lang="en-GB" dirty="0"/>
-              <a:t>Potential impact of COVID not modelled</a:t>
-            </a:r>
-          </a:p>
-        </p:txBody>
-      </p:sp>
     </p:spTree>
     <p:extLst>
       <p:ext uri="{BB962C8B-B14F-4D97-AF65-F5344CB8AC3E}">
@@ -4114,10 +3655,10 @@
       </p:sp>
       <p:pic>
         <p:nvPicPr>
-          <p:cNvPr id="3" name="Picture 2">
-            <a:extLst>
-              <a:ext uri="{FF2B5EF4-FFF2-40B4-BE49-F238E27FC236}">
-                <a16:creationId xmlns:a16="http://schemas.microsoft.com/office/drawing/2014/main" id="{48E855C9-DD4F-AFD3-088E-4F59C22787D7}"/>
+          <p:cNvPr id="5" name="Picture 4">
+            <a:extLst>
+              <a:ext uri="{FF2B5EF4-FFF2-40B4-BE49-F238E27FC236}">
+                <a16:creationId xmlns:a16="http://schemas.microsoft.com/office/drawing/2014/main" id="{5C9415B7-705A-88E8-22E9-C056170FFE0A}"/>
               </a:ext>
             </a:extLst>
           </p:cNvPr>
@@ -4134,8 +3675,8 @@
         </p:blipFill>
         <p:spPr>
           <a:xfrm>
-            <a:off x="838199" y="1335314"/>
-            <a:ext cx="10518701" cy="5346247"/>
+            <a:off x="293578" y="1690688"/>
+            <a:ext cx="11625304" cy="4710112"/>
           </a:xfrm>
           <a:prstGeom prst="rect">
             <a:avLst/>
@@ -4190,8 +3731,8 @@
         </p:nvSpPr>
         <p:spPr>
           <a:xfrm>
-            <a:off x="7950201" y="419063"/>
-            <a:ext cx="3864428" cy="1325563"/>
+            <a:off x="167519" y="204574"/>
+            <a:ext cx="7892748" cy="1325563"/>
           </a:xfrm>
         </p:spPr>
         <p:txBody>
@@ -4200,24 +3741,17 @@
           <a:p>
             <a:r>
               <a:rPr lang="en-GB" dirty="0"/>
-              <a:t>Tornado Plots:</a:t>
-            </a:r>
-            <a:br>
-              <a:rPr lang="en-GB" dirty="0"/>
-            </a:br>
-            <a:r>
-              <a:rPr lang="en-GB" dirty="0"/>
-              <a:t> Progression</a:t>
+              <a:t>Tornado Plots: Progression</a:t>
             </a:r>
           </a:p>
         </p:txBody>
       </p:sp>
       <p:pic>
         <p:nvPicPr>
-          <p:cNvPr id="3" name="Picture 2">
-            <a:extLst>
-              <a:ext uri="{FF2B5EF4-FFF2-40B4-BE49-F238E27FC236}">
-                <a16:creationId xmlns:a16="http://schemas.microsoft.com/office/drawing/2014/main" id="{BD336CA3-E827-74AA-CD3F-3ADF05DA70F1}"/>
+          <p:cNvPr id="5" name="Picture 4">
+            <a:extLst>
+              <a:ext uri="{FF2B5EF4-FFF2-40B4-BE49-F238E27FC236}">
+                <a16:creationId xmlns:a16="http://schemas.microsoft.com/office/drawing/2014/main" id="{3C7AAEEF-68D0-F824-D25D-86B26417EFD8}"/>
               </a:ext>
             </a:extLst>
           </p:cNvPr>
@@ -4234,38 +3768,8 @@
         </p:blipFill>
         <p:spPr>
           <a:xfrm>
-            <a:off x="0" y="0"/>
-            <a:ext cx="7358743" cy="3489252"/>
-          </a:xfrm>
-          <a:prstGeom prst="rect">
-            <a:avLst/>
-          </a:prstGeom>
-        </p:spPr>
-      </p:pic>
-      <p:pic>
-        <p:nvPicPr>
-          <p:cNvPr id="4" name="Picture 3">
-            <a:extLst>
-              <a:ext uri="{FF2B5EF4-FFF2-40B4-BE49-F238E27FC236}">
-                <a16:creationId xmlns:a16="http://schemas.microsoft.com/office/drawing/2014/main" id="{70E3D033-EDBB-2D85-E10E-4E8E62D5C55C}"/>
-              </a:ext>
-            </a:extLst>
-          </p:cNvPr>
-          <p:cNvPicPr>
-            <a:picLocks noChangeAspect="1"/>
-          </p:cNvPicPr>
-          <p:nvPr/>
-        </p:nvPicPr>
-        <p:blipFill>
-          <a:blip r:embed="rId3"/>
-          <a:stretch>
-            <a:fillRect/>
-          </a:stretch>
-        </p:blipFill>
-        <p:spPr>
-          <a:xfrm>
-            <a:off x="0" y="3368747"/>
-            <a:ext cx="7358746" cy="3489253"/>
+            <a:off x="287867" y="1246231"/>
+            <a:ext cx="9096796" cy="5109413"/>
           </a:xfrm>
           <a:prstGeom prst="rect">
             <a:avLst/>
@@ -4320,36 +3824,27 @@
         </p:nvSpPr>
         <p:spPr>
           <a:xfrm>
-            <a:off x="7950201" y="419063"/>
-            <a:ext cx="3864428" cy="1874194"/>
+            <a:off x="167519" y="204574"/>
+            <a:ext cx="9958614" cy="1325563"/>
           </a:xfrm>
         </p:spPr>
         <p:txBody>
-          <a:bodyPr>
-            <a:normAutofit fontScale="90000"/>
-          </a:bodyPr>
+          <a:bodyPr/>
           <a:lstStyle/>
           <a:p>
             <a:r>
               <a:rPr lang="en-GB" dirty="0"/>
-              <a:t>Tornado Plots:</a:t>
-            </a:r>
-            <a:br>
-              <a:rPr lang="en-GB" dirty="0"/>
-            </a:br>
-            <a:r>
-              <a:rPr lang="en-GB" dirty="0"/>
-              <a:t> Detected and Treated</a:t>
+              <a:t>Tornado Plots: Cumulative New Cases</a:t>
             </a:r>
           </a:p>
         </p:txBody>
       </p:sp>
       <p:pic>
         <p:nvPicPr>
-          <p:cNvPr id="3" name="Picture 2">
-            <a:extLst>
-              <a:ext uri="{FF2B5EF4-FFF2-40B4-BE49-F238E27FC236}">
-                <a16:creationId xmlns:a16="http://schemas.microsoft.com/office/drawing/2014/main" id="{BD336CA3-E827-74AA-CD3F-3ADF05DA70F1}"/>
+          <p:cNvPr id="5" name="Picture 4">
+            <a:extLst>
+              <a:ext uri="{FF2B5EF4-FFF2-40B4-BE49-F238E27FC236}">
+                <a16:creationId xmlns:a16="http://schemas.microsoft.com/office/drawing/2014/main" id="{2691102F-86F5-9A91-DB75-A5033E111456}"/>
               </a:ext>
             </a:extLst>
           </p:cNvPr>
@@ -4360,42 +3855,14 @@
         </p:nvPicPr>
         <p:blipFill>
           <a:blip r:embed="rId2"/>
-          <a:srcRect/>
-          <a:stretch/>
+          <a:stretch>
+            <a:fillRect/>
+          </a:stretch>
         </p:blipFill>
         <p:spPr>
           <a:xfrm>
-            <a:off x="0" y="0"/>
-            <a:ext cx="7358743" cy="3489252"/>
-          </a:xfrm>
-          <a:prstGeom prst="rect">
-            <a:avLst/>
-          </a:prstGeom>
-        </p:spPr>
-      </p:pic>
-      <p:pic>
-        <p:nvPicPr>
-          <p:cNvPr id="4" name="Picture 3">
-            <a:extLst>
-              <a:ext uri="{FF2B5EF4-FFF2-40B4-BE49-F238E27FC236}">
-                <a16:creationId xmlns:a16="http://schemas.microsoft.com/office/drawing/2014/main" id="{70E3D033-EDBB-2D85-E10E-4E8E62D5C55C}"/>
-              </a:ext>
-            </a:extLst>
-          </p:cNvPr>
-          <p:cNvPicPr>
-            <a:picLocks noChangeAspect="1"/>
-          </p:cNvPicPr>
-          <p:nvPr/>
-        </p:nvPicPr>
-        <p:blipFill>
-          <a:blip r:embed="rId3"/>
-          <a:srcRect/>
-          <a:stretch/>
-        </p:blipFill>
-        <p:spPr>
-          <a:xfrm>
-            <a:off x="0" y="3368747"/>
-            <a:ext cx="7358745" cy="3489253"/>
+            <a:off x="2065867" y="1530137"/>
+            <a:ext cx="7772400" cy="4365537"/>
           </a:xfrm>
           <a:prstGeom prst="rect">
             <a:avLst/>
@@ -4405,7 +3872,100 @@
     </p:spTree>
     <p:extLst>
       <p:ext uri="{BB962C8B-B14F-4D97-AF65-F5344CB8AC3E}">
-        <p14:creationId xmlns:p14="http://schemas.microsoft.com/office/powerpoint/2010/main" val="1866691237"/>
+        <p14:creationId xmlns:p14="http://schemas.microsoft.com/office/powerpoint/2010/main" val="2792450443"/>
+      </p:ext>
+    </p:extLst>
+  </p:cSld>
+  <p:clrMapOvr>
+    <a:masterClrMapping/>
+  </p:clrMapOvr>
+</p:sld>
+</file>
+
+<file path=ppt/slides/slide7.xml><?xml version="1.0" encoding="utf-8"?>
+<p:sld xmlns:a="http://schemas.openxmlformats.org/drawingml/2006/main" xmlns:r="http://schemas.openxmlformats.org/officeDocument/2006/relationships" xmlns:p="http://schemas.openxmlformats.org/presentationml/2006/main">
+  <p:cSld>
+    <p:spTree>
+      <p:nvGrpSpPr>
+        <p:cNvPr id="1" name=""/>
+        <p:cNvGrpSpPr/>
+        <p:nvPr/>
+      </p:nvGrpSpPr>
+      <p:grpSpPr>
+        <a:xfrm>
+          <a:off x="0" y="0"/>
+          <a:ext cx="0" cy="0"/>
+          <a:chOff x="0" y="0"/>
+          <a:chExt cx="0" cy="0"/>
+        </a:xfrm>
+      </p:grpSpPr>
+      <p:sp>
+        <p:nvSpPr>
+          <p:cNvPr id="2" name="Title 1">
+            <a:extLst>
+              <a:ext uri="{FF2B5EF4-FFF2-40B4-BE49-F238E27FC236}">
+                <a16:creationId xmlns:a16="http://schemas.microsoft.com/office/drawing/2014/main" id="{0D3F3A6F-B77F-5F36-593F-AC0FCC1F4217}"/>
+              </a:ext>
+            </a:extLst>
+          </p:cNvPr>
+          <p:cNvSpPr>
+            <a:spLocks noGrp="1"/>
+          </p:cNvSpPr>
+          <p:nvPr>
+            <p:ph type="title"/>
+          </p:nvPr>
+        </p:nvSpPr>
+        <p:spPr>
+          <a:xfrm>
+            <a:off x="167519" y="204574"/>
+            <a:ext cx="9958614" cy="1325563"/>
+          </a:xfrm>
+        </p:spPr>
+        <p:txBody>
+          <a:bodyPr/>
+          <a:lstStyle/>
+          <a:p>
+            <a:r>
+              <a:rPr lang="en-GB" dirty="0"/>
+              <a:t>Tornado Plots: Total TB deaths</a:t>
+            </a:r>
+          </a:p>
+        </p:txBody>
+      </p:sp>
+      <p:pic>
+        <p:nvPicPr>
+          <p:cNvPr id="6" name="Picture 5">
+            <a:extLst>
+              <a:ext uri="{FF2B5EF4-FFF2-40B4-BE49-F238E27FC236}">
+                <a16:creationId xmlns:a16="http://schemas.microsoft.com/office/drawing/2014/main" id="{15AED08F-34F6-5C03-670E-1B6B56B07016}"/>
+              </a:ext>
+            </a:extLst>
+          </p:cNvPr>
+          <p:cNvPicPr>
+            <a:picLocks noChangeAspect="1"/>
+          </p:cNvPicPr>
+          <p:nvPr/>
+        </p:nvPicPr>
+        <p:blipFill>
+          <a:blip r:embed="rId2"/>
+          <a:stretch>
+            <a:fillRect/>
+          </a:stretch>
+        </p:blipFill>
+        <p:spPr>
+          <a:xfrm>
+            <a:off x="1587798" y="1223653"/>
+            <a:ext cx="9016403" cy="5064258"/>
+          </a:xfrm>
+          <a:prstGeom prst="rect">
+            <a:avLst/>
+          </a:prstGeom>
+        </p:spPr>
+      </p:pic>
+    </p:spTree>
+    <p:extLst>
+      <p:ext uri="{BB962C8B-B14F-4D97-AF65-F5344CB8AC3E}">
+        <p14:creationId xmlns:p14="http://schemas.microsoft.com/office/powerpoint/2010/main" val="1535233132"/>
       </p:ext>
     </p:extLst>
   </p:cSld>

</xml_diff>

<commit_message>
Code setup - Sobel indices
</commit_message>
<xml_diff>
--- a/documentation/interim/Transmission Model Baseline.pptx
+++ b/documentation/interim/Transmission Model Baseline.pptx
@@ -12,6 +12,9 @@
     <p:sldId id="260" r:id="rId6"/>
     <p:sldId id="261" r:id="rId7"/>
     <p:sldId id="262" r:id="rId8"/>
+    <p:sldId id="263" r:id="rId9"/>
+    <p:sldId id="265" r:id="rId10"/>
+    <p:sldId id="264" r:id="rId11"/>
   </p:sldIdLst>
   <p:sldSz cx="12192000" cy="6858000"/>
   <p:notesSz cx="6858000" cy="9144000"/>
@@ -3398,6 +3401,192 @@
 </p:sld>
 </file>
 
+<file path=ppt/slides/slide10.xml><?xml version="1.0" encoding="utf-8"?>
+<p:sld xmlns:a="http://schemas.openxmlformats.org/drawingml/2006/main" xmlns:r="http://schemas.openxmlformats.org/officeDocument/2006/relationships" xmlns:p="http://schemas.openxmlformats.org/presentationml/2006/main">
+  <p:cSld>
+    <p:spTree>
+      <p:nvGrpSpPr>
+        <p:cNvPr id="1" name=""/>
+        <p:cNvGrpSpPr/>
+        <p:nvPr/>
+      </p:nvGrpSpPr>
+      <p:grpSpPr>
+        <a:xfrm>
+          <a:off x="0" y="0"/>
+          <a:ext cx="0" cy="0"/>
+          <a:chOff x="0" y="0"/>
+          <a:chExt cx="0" cy="0"/>
+        </a:xfrm>
+      </p:grpSpPr>
+      <p:sp>
+        <p:nvSpPr>
+          <p:cNvPr id="2" name="Title 1">
+            <a:extLst>
+              <a:ext uri="{FF2B5EF4-FFF2-40B4-BE49-F238E27FC236}">
+                <a16:creationId xmlns:a16="http://schemas.microsoft.com/office/drawing/2014/main" id="{15478AB6-6857-9623-7E1A-192EBEABD907}"/>
+              </a:ext>
+            </a:extLst>
+          </p:cNvPr>
+          <p:cNvSpPr>
+            <a:spLocks noGrp="1"/>
+          </p:cNvSpPr>
+          <p:nvPr>
+            <p:ph type="title"/>
+          </p:nvPr>
+        </p:nvSpPr>
+        <p:spPr/>
+        <p:txBody>
+          <a:bodyPr/>
+          <a:lstStyle/>
+          <a:p>
+            <a:r>
+              <a:rPr lang="en-GB" dirty="0"/>
+              <a:t>Sobel Indices: Total TB deaths</a:t>
+            </a:r>
+          </a:p>
+        </p:txBody>
+      </p:sp>
+      <p:sp>
+        <p:nvSpPr>
+          <p:cNvPr id="4" name="TextBox 3">
+            <a:extLst>
+              <a:ext uri="{FF2B5EF4-FFF2-40B4-BE49-F238E27FC236}">
+                <a16:creationId xmlns:a16="http://schemas.microsoft.com/office/drawing/2014/main" id="{90858584-0B27-8B07-8F84-49B2483AA795}"/>
+              </a:ext>
+            </a:extLst>
+          </p:cNvPr>
+          <p:cNvSpPr txBox="1"/>
+          <p:nvPr/>
+        </p:nvSpPr>
+        <p:spPr>
+          <a:xfrm>
+            <a:off x="2387943" y="1458031"/>
+            <a:ext cx="792892" cy="369332"/>
+          </a:xfrm>
+          <a:prstGeom prst="rect">
+            <a:avLst/>
+          </a:prstGeom>
+          <a:noFill/>
+        </p:spPr>
+        <p:txBody>
+          <a:bodyPr wrap="square" rtlCol="0">
+            <a:spAutoFit/>
+          </a:bodyPr>
+          <a:lstStyle/>
+          <a:p>
+            <a:r>
+              <a:rPr lang="en-GB" dirty="0"/>
+              <a:t>2005</a:t>
+            </a:r>
+          </a:p>
+        </p:txBody>
+      </p:sp>
+      <p:sp>
+        <p:nvSpPr>
+          <p:cNvPr id="5" name="TextBox 4">
+            <a:extLst>
+              <a:ext uri="{FF2B5EF4-FFF2-40B4-BE49-F238E27FC236}">
+                <a16:creationId xmlns:a16="http://schemas.microsoft.com/office/drawing/2014/main" id="{F20A994E-B90A-D185-CB1D-002C219DFF21}"/>
+              </a:ext>
+            </a:extLst>
+          </p:cNvPr>
+          <p:cNvSpPr txBox="1"/>
+          <p:nvPr/>
+        </p:nvSpPr>
+        <p:spPr>
+          <a:xfrm>
+            <a:off x="8483943" y="1501451"/>
+            <a:ext cx="792892" cy="369332"/>
+          </a:xfrm>
+          <a:prstGeom prst="rect">
+            <a:avLst/>
+          </a:prstGeom>
+          <a:noFill/>
+        </p:spPr>
+        <p:txBody>
+          <a:bodyPr wrap="square" rtlCol="0">
+            <a:spAutoFit/>
+          </a:bodyPr>
+          <a:lstStyle/>
+          <a:p>
+            <a:r>
+              <a:rPr lang="en-GB" dirty="0"/>
+              <a:t>2015</a:t>
+            </a:r>
+          </a:p>
+        </p:txBody>
+      </p:sp>
+      <p:pic>
+        <p:nvPicPr>
+          <p:cNvPr id="6" name="Picture 5">
+            <a:extLst>
+              <a:ext uri="{FF2B5EF4-FFF2-40B4-BE49-F238E27FC236}">
+                <a16:creationId xmlns:a16="http://schemas.microsoft.com/office/drawing/2014/main" id="{AADB713C-3209-3F89-CB4B-0071AEDD3F65}"/>
+              </a:ext>
+            </a:extLst>
+          </p:cNvPr>
+          <p:cNvPicPr>
+            <a:picLocks noChangeAspect="1"/>
+          </p:cNvPicPr>
+          <p:nvPr/>
+        </p:nvPicPr>
+        <p:blipFill>
+          <a:blip r:embed="rId2"/>
+          <a:srcRect/>
+          <a:stretch/>
+        </p:blipFill>
+        <p:spPr>
+          <a:xfrm>
+            <a:off x="422189" y="2050878"/>
+            <a:ext cx="4724400" cy="4140200"/>
+          </a:xfrm>
+          <a:prstGeom prst="rect">
+            <a:avLst/>
+          </a:prstGeom>
+        </p:spPr>
+      </p:pic>
+      <p:pic>
+        <p:nvPicPr>
+          <p:cNvPr id="7" name="Picture 6">
+            <a:extLst>
+              <a:ext uri="{FF2B5EF4-FFF2-40B4-BE49-F238E27FC236}">
+                <a16:creationId xmlns:a16="http://schemas.microsoft.com/office/drawing/2014/main" id="{A9028F52-B55E-E61D-FBD0-F9DE4D5C7465}"/>
+              </a:ext>
+            </a:extLst>
+          </p:cNvPr>
+          <p:cNvPicPr>
+            <a:picLocks noChangeAspect="1"/>
+          </p:cNvPicPr>
+          <p:nvPr/>
+        </p:nvPicPr>
+        <p:blipFill>
+          <a:blip r:embed="rId3"/>
+          <a:srcRect/>
+          <a:stretch/>
+        </p:blipFill>
+        <p:spPr>
+          <a:xfrm>
+            <a:off x="6412043" y="2149732"/>
+            <a:ext cx="4681320" cy="4140200"/>
+          </a:xfrm>
+          <a:prstGeom prst="rect">
+            <a:avLst/>
+          </a:prstGeom>
+        </p:spPr>
+      </p:pic>
+    </p:spTree>
+    <p:extLst>
+      <p:ext uri="{BB962C8B-B14F-4D97-AF65-F5344CB8AC3E}">
+        <p14:creationId xmlns:p14="http://schemas.microsoft.com/office/powerpoint/2010/main" val="22674240"/>
+      </p:ext>
+    </p:extLst>
+  </p:cSld>
+  <p:clrMapOvr>
+    <a:masterClrMapping/>
+  </p:clrMapOvr>
+</p:sld>
+</file>
+
 <file path=ppt/slides/slide2.xml><?xml version="1.0" encoding="utf-8"?>
 <p:sld xmlns:a="http://schemas.openxmlformats.org/drawingml/2006/main" xmlns:r="http://schemas.openxmlformats.org/officeDocument/2006/relationships" xmlns:p="http://schemas.openxmlformats.org/presentationml/2006/main">
   <p:cSld>
@@ -3966,6 +4155,399 @@
     <p:extLst>
       <p:ext uri="{BB962C8B-B14F-4D97-AF65-F5344CB8AC3E}">
         <p14:creationId xmlns:p14="http://schemas.microsoft.com/office/powerpoint/2010/main" val="1535233132"/>
+      </p:ext>
+    </p:extLst>
+  </p:cSld>
+  <p:clrMapOvr>
+    <a:masterClrMapping/>
+  </p:clrMapOvr>
+</p:sld>
+</file>
+
+<file path=ppt/slides/slide8.xml><?xml version="1.0" encoding="utf-8"?>
+<p:sld xmlns:a="http://schemas.openxmlformats.org/drawingml/2006/main" xmlns:r="http://schemas.openxmlformats.org/officeDocument/2006/relationships" xmlns:p="http://schemas.openxmlformats.org/presentationml/2006/main">
+  <p:cSld>
+    <p:spTree>
+      <p:nvGrpSpPr>
+        <p:cNvPr id="1" name=""/>
+        <p:cNvGrpSpPr/>
+        <p:nvPr/>
+      </p:nvGrpSpPr>
+      <p:grpSpPr>
+        <a:xfrm>
+          <a:off x="0" y="0"/>
+          <a:ext cx="0" cy="0"/>
+          <a:chOff x="0" y="0"/>
+          <a:chExt cx="0" cy="0"/>
+        </a:xfrm>
+      </p:grpSpPr>
+      <p:sp>
+        <p:nvSpPr>
+          <p:cNvPr id="2" name="Title 1">
+            <a:extLst>
+              <a:ext uri="{FF2B5EF4-FFF2-40B4-BE49-F238E27FC236}">
+                <a16:creationId xmlns:a16="http://schemas.microsoft.com/office/drawing/2014/main" id="{15478AB6-6857-9623-7E1A-192EBEABD907}"/>
+              </a:ext>
+            </a:extLst>
+          </p:cNvPr>
+          <p:cNvSpPr>
+            <a:spLocks noGrp="1"/>
+          </p:cNvSpPr>
+          <p:nvPr>
+            <p:ph type="title"/>
+          </p:nvPr>
+        </p:nvSpPr>
+        <p:spPr/>
+        <p:txBody>
+          <a:bodyPr/>
+          <a:lstStyle/>
+          <a:p>
+            <a:r>
+              <a:rPr lang="en-GB" dirty="0"/>
+              <a:t>Sobel Indices: Progression</a:t>
+            </a:r>
+          </a:p>
+        </p:txBody>
+      </p:sp>
+      <p:pic>
+        <p:nvPicPr>
+          <p:cNvPr id="3" name="Picture 2">
+            <a:extLst>
+              <a:ext uri="{FF2B5EF4-FFF2-40B4-BE49-F238E27FC236}">
+                <a16:creationId xmlns:a16="http://schemas.microsoft.com/office/drawing/2014/main" id="{DDEEF932-6543-28F6-E9D7-B08D94E7BD83}"/>
+              </a:ext>
+            </a:extLst>
+          </p:cNvPr>
+          <p:cNvPicPr>
+            <a:picLocks noChangeAspect="1"/>
+          </p:cNvPicPr>
+          <p:nvPr/>
+        </p:nvPicPr>
+        <p:blipFill>
+          <a:blip r:embed="rId2"/>
+          <a:stretch>
+            <a:fillRect/>
+          </a:stretch>
+        </p:blipFill>
+        <p:spPr>
+          <a:xfrm>
+            <a:off x="6736491" y="2025478"/>
+            <a:ext cx="4724400" cy="4165600"/>
+          </a:xfrm>
+          <a:prstGeom prst="rect">
+            <a:avLst/>
+          </a:prstGeom>
+        </p:spPr>
+      </p:pic>
+      <p:sp>
+        <p:nvSpPr>
+          <p:cNvPr id="4" name="TextBox 3">
+            <a:extLst>
+              <a:ext uri="{FF2B5EF4-FFF2-40B4-BE49-F238E27FC236}">
+                <a16:creationId xmlns:a16="http://schemas.microsoft.com/office/drawing/2014/main" id="{90858584-0B27-8B07-8F84-49B2483AA795}"/>
+              </a:ext>
+            </a:extLst>
+          </p:cNvPr>
+          <p:cNvSpPr txBox="1"/>
+          <p:nvPr/>
+        </p:nvSpPr>
+        <p:spPr>
+          <a:xfrm>
+            <a:off x="2387943" y="1458031"/>
+            <a:ext cx="792892" cy="369332"/>
+          </a:xfrm>
+          <a:prstGeom prst="rect">
+            <a:avLst/>
+          </a:prstGeom>
+          <a:noFill/>
+        </p:spPr>
+        <p:txBody>
+          <a:bodyPr wrap="square" rtlCol="0">
+            <a:spAutoFit/>
+          </a:bodyPr>
+          <a:lstStyle/>
+          <a:p>
+            <a:r>
+              <a:rPr lang="en-GB" dirty="0"/>
+              <a:t>2005</a:t>
+            </a:r>
+          </a:p>
+        </p:txBody>
+      </p:sp>
+      <p:pic>
+        <p:nvPicPr>
+          <p:cNvPr id="1026" name="Picture 2">
+            <a:extLst>
+              <a:ext uri="{FF2B5EF4-FFF2-40B4-BE49-F238E27FC236}">
+                <a16:creationId xmlns:a16="http://schemas.microsoft.com/office/drawing/2014/main" id="{E1082FEA-0ACC-BC8A-EBFF-D0879A74A2AA}"/>
+              </a:ext>
+            </a:extLst>
+          </p:cNvPr>
+          <p:cNvPicPr>
+            <a:picLocks noChangeAspect="1" noChangeArrowheads="1"/>
+          </p:cNvPicPr>
+          <p:nvPr/>
+        </p:nvPicPr>
+        <p:blipFill>
+          <a:blip r:embed="rId3">
+            <a:extLst>
+              <a:ext uri="{28A0092B-C50C-407E-A947-70E740481C1C}">
+                <a14:useLocalDpi xmlns:a14="http://schemas.microsoft.com/office/drawing/2010/main" val="0"/>
+              </a:ext>
+            </a:extLst>
+          </a:blip>
+          <a:srcRect/>
+          <a:stretch>
+            <a:fillRect/>
+          </a:stretch>
+        </p:blipFill>
+        <p:spPr bwMode="auto">
+          <a:xfrm>
+            <a:off x="422189" y="2050878"/>
+            <a:ext cx="4724400" cy="4140200"/>
+          </a:xfrm>
+          <a:prstGeom prst="rect">
+            <a:avLst/>
+          </a:prstGeom>
+          <a:noFill/>
+          <a:extLst>
+            <a:ext uri="{909E8E84-426E-40DD-AFC4-6F175D3DCCD1}">
+              <a14:hiddenFill xmlns:a14="http://schemas.microsoft.com/office/drawing/2010/main">
+                <a:solidFill>
+                  <a:srgbClr val="FFFFFF"/>
+                </a:solidFill>
+              </a14:hiddenFill>
+            </a:ext>
+          </a:extLst>
+        </p:spPr>
+      </p:pic>
+      <p:sp>
+        <p:nvSpPr>
+          <p:cNvPr id="5" name="TextBox 4">
+            <a:extLst>
+              <a:ext uri="{FF2B5EF4-FFF2-40B4-BE49-F238E27FC236}">
+                <a16:creationId xmlns:a16="http://schemas.microsoft.com/office/drawing/2014/main" id="{F20A994E-B90A-D185-CB1D-002C219DFF21}"/>
+              </a:ext>
+            </a:extLst>
+          </p:cNvPr>
+          <p:cNvSpPr txBox="1"/>
+          <p:nvPr/>
+        </p:nvSpPr>
+        <p:spPr>
+          <a:xfrm>
+            <a:off x="8483943" y="1501451"/>
+            <a:ext cx="792892" cy="369332"/>
+          </a:xfrm>
+          <a:prstGeom prst="rect">
+            <a:avLst/>
+          </a:prstGeom>
+          <a:noFill/>
+        </p:spPr>
+        <p:txBody>
+          <a:bodyPr wrap="square" rtlCol="0">
+            <a:spAutoFit/>
+          </a:bodyPr>
+          <a:lstStyle/>
+          <a:p>
+            <a:r>
+              <a:rPr lang="en-GB" dirty="0"/>
+              <a:t>2015</a:t>
+            </a:r>
+          </a:p>
+        </p:txBody>
+      </p:sp>
+    </p:spTree>
+    <p:extLst>
+      <p:ext uri="{BB962C8B-B14F-4D97-AF65-F5344CB8AC3E}">
+        <p14:creationId xmlns:p14="http://schemas.microsoft.com/office/powerpoint/2010/main" val="1948677948"/>
+      </p:ext>
+    </p:extLst>
+  </p:cSld>
+  <p:clrMapOvr>
+    <a:masterClrMapping/>
+  </p:clrMapOvr>
+</p:sld>
+</file>
+
+<file path=ppt/slides/slide9.xml><?xml version="1.0" encoding="utf-8"?>
+<p:sld xmlns:a="http://schemas.openxmlformats.org/drawingml/2006/main" xmlns:r="http://schemas.openxmlformats.org/officeDocument/2006/relationships" xmlns:p="http://schemas.openxmlformats.org/presentationml/2006/main">
+  <p:cSld>
+    <p:spTree>
+      <p:nvGrpSpPr>
+        <p:cNvPr id="1" name=""/>
+        <p:cNvGrpSpPr/>
+        <p:nvPr/>
+      </p:nvGrpSpPr>
+      <p:grpSpPr>
+        <a:xfrm>
+          <a:off x="0" y="0"/>
+          <a:ext cx="0" cy="0"/>
+          <a:chOff x="0" y="0"/>
+          <a:chExt cx="0" cy="0"/>
+        </a:xfrm>
+      </p:grpSpPr>
+      <p:sp>
+        <p:nvSpPr>
+          <p:cNvPr id="2" name="Title 1">
+            <a:extLst>
+              <a:ext uri="{FF2B5EF4-FFF2-40B4-BE49-F238E27FC236}">
+                <a16:creationId xmlns:a16="http://schemas.microsoft.com/office/drawing/2014/main" id="{15478AB6-6857-9623-7E1A-192EBEABD907}"/>
+              </a:ext>
+            </a:extLst>
+          </p:cNvPr>
+          <p:cNvSpPr>
+            <a:spLocks noGrp="1"/>
+          </p:cNvSpPr>
+          <p:nvPr>
+            <p:ph type="title"/>
+          </p:nvPr>
+        </p:nvSpPr>
+        <p:spPr/>
+        <p:txBody>
+          <a:bodyPr/>
+          <a:lstStyle/>
+          <a:p>
+            <a:r>
+              <a:rPr lang="en-GB" dirty="0"/>
+              <a:t>Sobel Indices: New Cases</a:t>
+            </a:r>
+          </a:p>
+        </p:txBody>
+      </p:sp>
+      <p:sp>
+        <p:nvSpPr>
+          <p:cNvPr id="4" name="TextBox 3">
+            <a:extLst>
+              <a:ext uri="{FF2B5EF4-FFF2-40B4-BE49-F238E27FC236}">
+                <a16:creationId xmlns:a16="http://schemas.microsoft.com/office/drawing/2014/main" id="{90858584-0B27-8B07-8F84-49B2483AA795}"/>
+              </a:ext>
+            </a:extLst>
+          </p:cNvPr>
+          <p:cNvSpPr txBox="1"/>
+          <p:nvPr/>
+        </p:nvSpPr>
+        <p:spPr>
+          <a:xfrm>
+            <a:off x="2387943" y="1458031"/>
+            <a:ext cx="792892" cy="369332"/>
+          </a:xfrm>
+          <a:prstGeom prst="rect">
+            <a:avLst/>
+          </a:prstGeom>
+          <a:noFill/>
+        </p:spPr>
+        <p:txBody>
+          <a:bodyPr wrap="square" rtlCol="0">
+            <a:spAutoFit/>
+          </a:bodyPr>
+          <a:lstStyle/>
+          <a:p>
+            <a:r>
+              <a:rPr lang="en-GB" dirty="0"/>
+              <a:t>2005</a:t>
+            </a:r>
+          </a:p>
+        </p:txBody>
+      </p:sp>
+      <p:sp>
+        <p:nvSpPr>
+          <p:cNvPr id="5" name="TextBox 4">
+            <a:extLst>
+              <a:ext uri="{FF2B5EF4-FFF2-40B4-BE49-F238E27FC236}">
+                <a16:creationId xmlns:a16="http://schemas.microsoft.com/office/drawing/2014/main" id="{F20A994E-B90A-D185-CB1D-002C219DFF21}"/>
+              </a:ext>
+            </a:extLst>
+          </p:cNvPr>
+          <p:cNvSpPr txBox="1"/>
+          <p:nvPr/>
+        </p:nvSpPr>
+        <p:spPr>
+          <a:xfrm>
+            <a:off x="8483943" y="1501451"/>
+            <a:ext cx="792892" cy="369332"/>
+          </a:xfrm>
+          <a:prstGeom prst="rect">
+            <a:avLst/>
+          </a:prstGeom>
+          <a:noFill/>
+        </p:spPr>
+        <p:txBody>
+          <a:bodyPr wrap="square" rtlCol="0">
+            <a:spAutoFit/>
+          </a:bodyPr>
+          <a:lstStyle/>
+          <a:p>
+            <a:r>
+              <a:rPr lang="en-GB" dirty="0"/>
+              <a:t>2015</a:t>
+            </a:r>
+          </a:p>
+        </p:txBody>
+      </p:sp>
+      <p:pic>
+        <p:nvPicPr>
+          <p:cNvPr id="6" name="Picture 5">
+            <a:extLst>
+              <a:ext uri="{FF2B5EF4-FFF2-40B4-BE49-F238E27FC236}">
+                <a16:creationId xmlns:a16="http://schemas.microsoft.com/office/drawing/2014/main" id="{5E8B063A-22BB-B66D-64A1-B1114782FD32}"/>
+              </a:ext>
+            </a:extLst>
+          </p:cNvPr>
+          <p:cNvPicPr>
+            <a:picLocks noChangeAspect="1"/>
+          </p:cNvPicPr>
+          <p:nvPr/>
+        </p:nvPicPr>
+        <p:blipFill>
+          <a:blip r:embed="rId2"/>
+          <a:stretch>
+            <a:fillRect/>
+          </a:stretch>
+        </p:blipFill>
+        <p:spPr>
+          <a:xfrm>
+            <a:off x="422189" y="2063235"/>
+            <a:ext cx="4724400" cy="4140200"/>
+          </a:xfrm>
+          <a:prstGeom prst="rect">
+            <a:avLst/>
+          </a:prstGeom>
+        </p:spPr>
+      </p:pic>
+      <p:pic>
+        <p:nvPicPr>
+          <p:cNvPr id="7" name="Picture 6">
+            <a:extLst>
+              <a:ext uri="{FF2B5EF4-FFF2-40B4-BE49-F238E27FC236}">
+                <a16:creationId xmlns:a16="http://schemas.microsoft.com/office/drawing/2014/main" id="{201AE0D2-C0B2-BA65-7546-019D8DA2F59E}"/>
+              </a:ext>
+            </a:extLst>
+          </p:cNvPr>
+          <p:cNvPicPr>
+            <a:picLocks noChangeAspect="1"/>
+          </p:cNvPicPr>
+          <p:nvPr/>
+        </p:nvPicPr>
+        <p:blipFill>
+          <a:blip r:embed="rId3"/>
+          <a:stretch>
+            <a:fillRect/>
+          </a:stretch>
+        </p:blipFill>
+        <p:spPr>
+          <a:xfrm>
+            <a:off x="6518189" y="1982573"/>
+            <a:ext cx="4724400" cy="4152900"/>
+          </a:xfrm>
+          <a:prstGeom prst="rect">
+            <a:avLst/>
+          </a:prstGeom>
+        </p:spPr>
+      </p:pic>
+    </p:spTree>
+    <p:extLst>
+      <p:ext uri="{BB962C8B-B14F-4D97-AF65-F5344CB8AC3E}">
+        <p14:creationId xmlns:p14="http://schemas.microsoft.com/office/powerpoint/2010/main" val="762449901"/>
       </p:ext>
     </p:extLst>
   </p:cSld>

</xml_diff>

<commit_message>
New static scenarios, dynamic equlibirum and exp 1
</commit_message>
<xml_diff>
--- a/documentation/interim/Transmission Model Baseline.pptx
+++ b/documentation/interim/Transmission Model Baseline.pptx
@@ -4,6 +4,9 @@
   <p:sldMasterIdLst>
     <p:sldMasterId id="2147483648" r:id="rId1"/>
   </p:sldMasterIdLst>
+  <p:notesMasterIdLst>
+    <p:notesMasterId r:id="rId15"/>
+  </p:notesMasterIdLst>
   <p:sldIdLst>
     <p:sldId id="256" r:id="rId2"/>
     <p:sldId id="257" r:id="rId3"/>
@@ -15,6 +18,9 @@
     <p:sldId id="263" r:id="rId9"/>
     <p:sldId id="265" r:id="rId10"/>
     <p:sldId id="264" r:id="rId11"/>
+    <p:sldId id="266" r:id="rId12"/>
+    <p:sldId id="267" r:id="rId13"/>
+    <p:sldId id="268" r:id="rId14"/>
   </p:sldIdLst>
   <p:sldSz cx="12192000" cy="6858000"/>
   <p:notesSz cx="6858000" cy="9144000"/>
@@ -121,6 +127,607 @@
 </p:presentation>
 </file>
 
+<file path=ppt/notesMasters/notesMaster1.xml><?xml version="1.0" encoding="utf-8"?>
+<p:notesMaster xmlns:a="http://schemas.openxmlformats.org/drawingml/2006/main" xmlns:r="http://schemas.openxmlformats.org/officeDocument/2006/relationships" xmlns:p="http://schemas.openxmlformats.org/presentationml/2006/main">
+  <p:cSld>
+    <p:bg>
+      <p:bgRef idx="1001">
+        <a:schemeClr val="bg1"/>
+      </p:bgRef>
+    </p:bg>
+    <p:spTree>
+      <p:nvGrpSpPr>
+        <p:cNvPr id="1" name=""/>
+        <p:cNvGrpSpPr/>
+        <p:nvPr/>
+      </p:nvGrpSpPr>
+      <p:grpSpPr>
+        <a:xfrm>
+          <a:off x="0" y="0"/>
+          <a:ext cx="0" cy="0"/>
+          <a:chOff x="0" y="0"/>
+          <a:chExt cx="0" cy="0"/>
+        </a:xfrm>
+      </p:grpSpPr>
+      <p:sp>
+        <p:nvSpPr>
+          <p:cNvPr id="2" name="Header Placeholder 1"/>
+          <p:cNvSpPr>
+            <a:spLocks noGrp="1"/>
+          </p:cNvSpPr>
+          <p:nvPr>
+            <p:ph type="hdr" sz="quarter"/>
+          </p:nvPr>
+        </p:nvSpPr>
+        <p:spPr>
+          <a:xfrm>
+            <a:off x="0" y="0"/>
+            <a:ext cx="2971800" cy="458788"/>
+          </a:xfrm>
+          <a:prstGeom prst="rect">
+            <a:avLst/>
+          </a:prstGeom>
+        </p:spPr>
+        <p:txBody>
+          <a:bodyPr vert="horz" lIns="91440" tIns="45720" rIns="91440" bIns="45720" rtlCol="0"/>
+          <a:lstStyle>
+            <a:lvl1pPr algn="l">
+              <a:defRPr sz="1200"/>
+            </a:lvl1pPr>
+          </a:lstStyle>
+          <a:p>
+            <a:endParaRPr lang="en-GB"/>
+          </a:p>
+        </p:txBody>
+      </p:sp>
+      <p:sp>
+        <p:nvSpPr>
+          <p:cNvPr id="3" name="Date Placeholder 2"/>
+          <p:cNvSpPr>
+            <a:spLocks noGrp="1"/>
+          </p:cNvSpPr>
+          <p:nvPr>
+            <p:ph type="dt" idx="1"/>
+          </p:nvPr>
+        </p:nvSpPr>
+        <p:spPr>
+          <a:xfrm>
+            <a:off x="3884613" y="0"/>
+            <a:ext cx="2971800" cy="458788"/>
+          </a:xfrm>
+          <a:prstGeom prst="rect">
+            <a:avLst/>
+          </a:prstGeom>
+        </p:spPr>
+        <p:txBody>
+          <a:bodyPr vert="horz" lIns="91440" tIns="45720" rIns="91440" bIns="45720" rtlCol="0"/>
+          <a:lstStyle>
+            <a:lvl1pPr algn="r">
+              <a:defRPr sz="1200"/>
+            </a:lvl1pPr>
+          </a:lstStyle>
+          <a:p>
+            <a:fld id="{57FFCFAA-812D-1847-A5BB-105B73839FDE}" type="datetimeFigureOut">
+              <a:rPr lang="en-GB" smtClean="0"/>
+              <a:t>01/05/2024</a:t>
+            </a:fld>
+            <a:endParaRPr lang="en-GB"/>
+          </a:p>
+        </p:txBody>
+      </p:sp>
+      <p:sp>
+        <p:nvSpPr>
+          <p:cNvPr id="4" name="Slide Image Placeholder 3"/>
+          <p:cNvSpPr>
+            <a:spLocks noGrp="1" noRot="1" noChangeAspect="1"/>
+          </p:cNvSpPr>
+          <p:nvPr>
+            <p:ph type="sldImg" idx="2"/>
+          </p:nvPr>
+        </p:nvSpPr>
+        <p:spPr>
+          <a:xfrm>
+            <a:off x="685800" y="1143000"/>
+            <a:ext cx="5486400" cy="3086100"/>
+          </a:xfrm>
+          <a:prstGeom prst="rect">
+            <a:avLst/>
+          </a:prstGeom>
+          <a:noFill/>
+          <a:ln w="12700">
+            <a:solidFill>
+              <a:prstClr val="black"/>
+            </a:solidFill>
+          </a:ln>
+        </p:spPr>
+        <p:txBody>
+          <a:bodyPr vert="horz" lIns="91440" tIns="45720" rIns="91440" bIns="45720" rtlCol="0" anchor="ctr"/>
+          <a:lstStyle/>
+          <a:p>
+            <a:endParaRPr lang="en-GB"/>
+          </a:p>
+        </p:txBody>
+      </p:sp>
+      <p:sp>
+        <p:nvSpPr>
+          <p:cNvPr id="5" name="Notes Placeholder 4"/>
+          <p:cNvSpPr>
+            <a:spLocks noGrp="1"/>
+          </p:cNvSpPr>
+          <p:nvPr>
+            <p:ph type="body" sz="quarter" idx="3"/>
+          </p:nvPr>
+        </p:nvSpPr>
+        <p:spPr>
+          <a:xfrm>
+            <a:off x="685800" y="4400550"/>
+            <a:ext cx="5486400" cy="3600450"/>
+          </a:xfrm>
+          <a:prstGeom prst="rect">
+            <a:avLst/>
+          </a:prstGeom>
+        </p:spPr>
+        <p:txBody>
+          <a:bodyPr vert="horz" lIns="91440" tIns="45720" rIns="91440" bIns="45720" rtlCol="0"/>
+          <a:lstStyle/>
+          <a:p>
+            <a:pPr lvl="0"/>
+            <a:r>
+              <a:rPr lang="en-GB"/>
+              <a:t>Click to edit Master text styles</a:t>
+            </a:r>
+          </a:p>
+          <a:p>
+            <a:pPr lvl="1"/>
+            <a:r>
+              <a:rPr lang="en-GB"/>
+              <a:t>Second level</a:t>
+            </a:r>
+          </a:p>
+          <a:p>
+            <a:pPr lvl="2"/>
+            <a:r>
+              <a:rPr lang="en-GB"/>
+              <a:t>Third level</a:t>
+            </a:r>
+          </a:p>
+          <a:p>
+            <a:pPr lvl="3"/>
+            <a:r>
+              <a:rPr lang="en-GB"/>
+              <a:t>Fourth level</a:t>
+            </a:r>
+          </a:p>
+          <a:p>
+            <a:pPr lvl="4"/>
+            <a:r>
+              <a:rPr lang="en-GB"/>
+              <a:t>Fifth level</a:t>
+            </a:r>
+          </a:p>
+        </p:txBody>
+      </p:sp>
+      <p:sp>
+        <p:nvSpPr>
+          <p:cNvPr id="6" name="Footer Placeholder 5"/>
+          <p:cNvSpPr>
+            <a:spLocks noGrp="1"/>
+          </p:cNvSpPr>
+          <p:nvPr>
+            <p:ph type="ftr" sz="quarter" idx="4"/>
+          </p:nvPr>
+        </p:nvSpPr>
+        <p:spPr>
+          <a:xfrm>
+            <a:off x="0" y="8685213"/>
+            <a:ext cx="2971800" cy="458787"/>
+          </a:xfrm>
+          <a:prstGeom prst="rect">
+            <a:avLst/>
+          </a:prstGeom>
+        </p:spPr>
+        <p:txBody>
+          <a:bodyPr vert="horz" lIns="91440" tIns="45720" rIns="91440" bIns="45720" rtlCol="0" anchor="b"/>
+          <a:lstStyle>
+            <a:lvl1pPr algn="l">
+              <a:defRPr sz="1200"/>
+            </a:lvl1pPr>
+          </a:lstStyle>
+          <a:p>
+            <a:endParaRPr lang="en-GB"/>
+          </a:p>
+        </p:txBody>
+      </p:sp>
+      <p:sp>
+        <p:nvSpPr>
+          <p:cNvPr id="7" name="Slide Number Placeholder 6"/>
+          <p:cNvSpPr>
+            <a:spLocks noGrp="1"/>
+          </p:cNvSpPr>
+          <p:nvPr>
+            <p:ph type="sldNum" sz="quarter" idx="5"/>
+          </p:nvPr>
+        </p:nvSpPr>
+        <p:spPr>
+          <a:xfrm>
+            <a:off x="3884613" y="8685213"/>
+            <a:ext cx="2971800" cy="458787"/>
+          </a:xfrm>
+          <a:prstGeom prst="rect">
+            <a:avLst/>
+          </a:prstGeom>
+        </p:spPr>
+        <p:txBody>
+          <a:bodyPr vert="horz" lIns="91440" tIns="45720" rIns="91440" bIns="45720" rtlCol="0" anchor="b"/>
+          <a:lstStyle>
+            <a:lvl1pPr algn="r">
+              <a:defRPr sz="1200"/>
+            </a:lvl1pPr>
+          </a:lstStyle>
+          <a:p>
+            <a:fld id="{485BF608-1CF3-7940-8667-CE6C14C5B088}" type="slidenum">
+              <a:rPr lang="en-GB" smtClean="0"/>
+              <a:t>‹#›</a:t>
+            </a:fld>
+            <a:endParaRPr lang="en-GB"/>
+          </a:p>
+        </p:txBody>
+      </p:sp>
+    </p:spTree>
+    <p:extLst>
+      <p:ext uri="{BB962C8B-B14F-4D97-AF65-F5344CB8AC3E}">
+        <p14:creationId xmlns:p14="http://schemas.microsoft.com/office/powerpoint/2010/main" val="1961892595"/>
+      </p:ext>
+    </p:extLst>
+  </p:cSld>
+  <p:clrMap bg1="lt1" tx1="dk1" bg2="lt2" tx2="dk2" accent1="accent1" accent2="accent2" accent3="accent3" accent4="accent4" accent5="accent5" accent6="accent6" hlink="hlink" folHlink="folHlink"/>
+  <p:notesStyle>
+    <a:lvl1pPr marL="0" algn="l" defTabSz="914400" rtl="0" eaLnBrk="1" latinLnBrk="0" hangingPunct="1">
+      <a:defRPr sz="1200" kern="1200">
+        <a:solidFill>
+          <a:schemeClr val="tx1"/>
+        </a:solidFill>
+        <a:latin typeface="+mn-lt"/>
+        <a:ea typeface="+mn-ea"/>
+        <a:cs typeface="+mn-cs"/>
+      </a:defRPr>
+    </a:lvl1pPr>
+    <a:lvl2pPr marL="457200" algn="l" defTabSz="914400" rtl="0" eaLnBrk="1" latinLnBrk="0" hangingPunct="1">
+      <a:defRPr sz="1200" kern="1200">
+        <a:solidFill>
+          <a:schemeClr val="tx1"/>
+        </a:solidFill>
+        <a:latin typeface="+mn-lt"/>
+        <a:ea typeface="+mn-ea"/>
+        <a:cs typeface="+mn-cs"/>
+      </a:defRPr>
+    </a:lvl2pPr>
+    <a:lvl3pPr marL="914400" algn="l" defTabSz="914400" rtl="0" eaLnBrk="1" latinLnBrk="0" hangingPunct="1">
+      <a:defRPr sz="1200" kern="1200">
+        <a:solidFill>
+          <a:schemeClr val="tx1"/>
+        </a:solidFill>
+        <a:latin typeface="+mn-lt"/>
+        <a:ea typeface="+mn-ea"/>
+        <a:cs typeface="+mn-cs"/>
+      </a:defRPr>
+    </a:lvl3pPr>
+    <a:lvl4pPr marL="1371600" algn="l" defTabSz="914400" rtl="0" eaLnBrk="1" latinLnBrk="0" hangingPunct="1">
+      <a:defRPr sz="1200" kern="1200">
+        <a:solidFill>
+          <a:schemeClr val="tx1"/>
+        </a:solidFill>
+        <a:latin typeface="+mn-lt"/>
+        <a:ea typeface="+mn-ea"/>
+        <a:cs typeface="+mn-cs"/>
+      </a:defRPr>
+    </a:lvl4pPr>
+    <a:lvl5pPr marL="1828800" algn="l" defTabSz="914400" rtl="0" eaLnBrk="1" latinLnBrk="0" hangingPunct="1">
+      <a:defRPr sz="1200" kern="1200">
+        <a:solidFill>
+          <a:schemeClr val="tx1"/>
+        </a:solidFill>
+        <a:latin typeface="+mn-lt"/>
+        <a:ea typeface="+mn-ea"/>
+        <a:cs typeface="+mn-cs"/>
+      </a:defRPr>
+    </a:lvl5pPr>
+    <a:lvl6pPr marL="2286000" algn="l" defTabSz="914400" rtl="0" eaLnBrk="1" latinLnBrk="0" hangingPunct="1">
+      <a:defRPr sz="1200" kern="1200">
+        <a:solidFill>
+          <a:schemeClr val="tx1"/>
+        </a:solidFill>
+        <a:latin typeface="+mn-lt"/>
+        <a:ea typeface="+mn-ea"/>
+        <a:cs typeface="+mn-cs"/>
+      </a:defRPr>
+    </a:lvl6pPr>
+    <a:lvl7pPr marL="2743200" algn="l" defTabSz="914400" rtl="0" eaLnBrk="1" latinLnBrk="0" hangingPunct="1">
+      <a:defRPr sz="1200" kern="1200">
+        <a:solidFill>
+          <a:schemeClr val="tx1"/>
+        </a:solidFill>
+        <a:latin typeface="+mn-lt"/>
+        <a:ea typeface="+mn-ea"/>
+        <a:cs typeface="+mn-cs"/>
+      </a:defRPr>
+    </a:lvl7pPr>
+    <a:lvl8pPr marL="3200400" algn="l" defTabSz="914400" rtl="0" eaLnBrk="1" latinLnBrk="0" hangingPunct="1">
+      <a:defRPr sz="1200" kern="1200">
+        <a:solidFill>
+          <a:schemeClr val="tx1"/>
+        </a:solidFill>
+        <a:latin typeface="+mn-lt"/>
+        <a:ea typeface="+mn-ea"/>
+        <a:cs typeface="+mn-cs"/>
+      </a:defRPr>
+    </a:lvl8pPr>
+    <a:lvl9pPr marL="3657600" algn="l" defTabSz="914400" rtl="0" eaLnBrk="1" latinLnBrk="0" hangingPunct="1">
+      <a:defRPr sz="1200" kern="1200">
+        <a:solidFill>
+          <a:schemeClr val="tx1"/>
+        </a:solidFill>
+        <a:latin typeface="+mn-lt"/>
+        <a:ea typeface="+mn-ea"/>
+        <a:cs typeface="+mn-cs"/>
+      </a:defRPr>
+    </a:lvl9pPr>
+  </p:notesStyle>
+</p:notesMaster>
+</file>
+
+<file path=ppt/notesSlides/notesSlide1.xml><?xml version="1.0" encoding="utf-8"?>
+<p:notes xmlns:a="http://schemas.openxmlformats.org/drawingml/2006/main" xmlns:r="http://schemas.openxmlformats.org/officeDocument/2006/relationships" xmlns:p="http://schemas.openxmlformats.org/presentationml/2006/main">
+  <p:cSld>
+    <p:spTree>
+      <p:nvGrpSpPr>
+        <p:cNvPr id="1" name=""/>
+        <p:cNvGrpSpPr/>
+        <p:nvPr/>
+      </p:nvGrpSpPr>
+      <p:grpSpPr>
+        <a:xfrm>
+          <a:off x="0" y="0"/>
+          <a:ext cx="0" cy="0"/>
+          <a:chOff x="0" y="0"/>
+          <a:chExt cx="0" cy="0"/>
+        </a:xfrm>
+      </p:grpSpPr>
+      <p:sp>
+        <p:nvSpPr>
+          <p:cNvPr id="2" name="Slide Image Placeholder 1"/>
+          <p:cNvSpPr>
+            <a:spLocks noGrp="1" noRot="1" noChangeAspect="1"/>
+          </p:cNvSpPr>
+          <p:nvPr>
+            <p:ph type="sldImg"/>
+          </p:nvPr>
+        </p:nvSpPr>
+        <p:spPr/>
+      </p:sp>
+      <p:sp>
+        <p:nvSpPr>
+          <p:cNvPr id="3" name="Notes Placeholder 2"/>
+          <p:cNvSpPr>
+            <a:spLocks noGrp="1"/>
+          </p:cNvSpPr>
+          <p:nvPr>
+            <p:ph type="body" idx="1"/>
+          </p:nvPr>
+        </p:nvSpPr>
+        <p:spPr/>
+        <p:txBody>
+          <a:bodyPr/>
+          <a:lstStyle/>
+          <a:p>
+            <a:endParaRPr lang="en-GB" dirty="0"/>
+          </a:p>
+        </p:txBody>
+      </p:sp>
+      <p:sp>
+        <p:nvSpPr>
+          <p:cNvPr id="4" name="Slide Number Placeholder 3"/>
+          <p:cNvSpPr>
+            <a:spLocks noGrp="1"/>
+          </p:cNvSpPr>
+          <p:nvPr>
+            <p:ph type="sldNum" sz="quarter" idx="5"/>
+          </p:nvPr>
+        </p:nvSpPr>
+        <p:spPr/>
+        <p:txBody>
+          <a:bodyPr/>
+          <a:lstStyle/>
+          <a:p>
+            <a:fld id="{485BF608-1CF3-7940-8667-CE6C14C5B088}" type="slidenum">
+              <a:rPr lang="en-GB" smtClean="0"/>
+              <a:t>11</a:t>
+            </a:fld>
+            <a:endParaRPr lang="en-GB"/>
+          </a:p>
+        </p:txBody>
+      </p:sp>
+    </p:spTree>
+    <p:extLst>
+      <p:ext uri="{BB962C8B-B14F-4D97-AF65-F5344CB8AC3E}">
+        <p14:creationId xmlns:p14="http://schemas.microsoft.com/office/powerpoint/2010/main" val="2074385159"/>
+      </p:ext>
+    </p:extLst>
+  </p:cSld>
+  <p:clrMapOvr>
+    <a:masterClrMapping/>
+  </p:clrMapOvr>
+</p:notes>
+</file>
+
+<file path=ppt/notesSlides/notesSlide2.xml><?xml version="1.0" encoding="utf-8"?>
+<p:notes xmlns:a="http://schemas.openxmlformats.org/drawingml/2006/main" xmlns:r="http://schemas.openxmlformats.org/officeDocument/2006/relationships" xmlns:p="http://schemas.openxmlformats.org/presentationml/2006/main">
+  <p:cSld>
+    <p:spTree>
+      <p:nvGrpSpPr>
+        <p:cNvPr id="1" name=""/>
+        <p:cNvGrpSpPr/>
+        <p:nvPr/>
+      </p:nvGrpSpPr>
+      <p:grpSpPr>
+        <a:xfrm>
+          <a:off x="0" y="0"/>
+          <a:ext cx="0" cy="0"/>
+          <a:chOff x="0" y="0"/>
+          <a:chExt cx="0" cy="0"/>
+        </a:xfrm>
+      </p:grpSpPr>
+      <p:sp>
+        <p:nvSpPr>
+          <p:cNvPr id="2" name="Slide Image Placeholder 1"/>
+          <p:cNvSpPr>
+            <a:spLocks noGrp="1" noRot="1" noChangeAspect="1"/>
+          </p:cNvSpPr>
+          <p:nvPr>
+            <p:ph type="sldImg"/>
+          </p:nvPr>
+        </p:nvSpPr>
+        <p:spPr/>
+      </p:sp>
+      <p:sp>
+        <p:nvSpPr>
+          <p:cNvPr id="3" name="Notes Placeholder 2"/>
+          <p:cNvSpPr>
+            <a:spLocks noGrp="1"/>
+          </p:cNvSpPr>
+          <p:nvPr>
+            <p:ph type="body" idx="1"/>
+          </p:nvPr>
+        </p:nvSpPr>
+        <p:spPr/>
+        <p:txBody>
+          <a:bodyPr/>
+          <a:lstStyle/>
+          <a:p>
+            <a:endParaRPr lang="en-GB" dirty="0"/>
+          </a:p>
+        </p:txBody>
+      </p:sp>
+      <p:sp>
+        <p:nvSpPr>
+          <p:cNvPr id="4" name="Slide Number Placeholder 3"/>
+          <p:cNvSpPr>
+            <a:spLocks noGrp="1"/>
+          </p:cNvSpPr>
+          <p:nvPr>
+            <p:ph type="sldNum" sz="quarter" idx="5"/>
+          </p:nvPr>
+        </p:nvSpPr>
+        <p:spPr/>
+        <p:txBody>
+          <a:bodyPr/>
+          <a:lstStyle/>
+          <a:p>
+            <a:fld id="{485BF608-1CF3-7940-8667-CE6C14C5B088}" type="slidenum">
+              <a:rPr lang="en-GB" smtClean="0"/>
+              <a:t>12</a:t>
+            </a:fld>
+            <a:endParaRPr lang="en-GB"/>
+          </a:p>
+        </p:txBody>
+      </p:sp>
+    </p:spTree>
+    <p:extLst>
+      <p:ext uri="{BB962C8B-B14F-4D97-AF65-F5344CB8AC3E}">
+        <p14:creationId xmlns:p14="http://schemas.microsoft.com/office/powerpoint/2010/main" val="3266709832"/>
+      </p:ext>
+    </p:extLst>
+  </p:cSld>
+  <p:clrMapOvr>
+    <a:masterClrMapping/>
+  </p:clrMapOvr>
+</p:notes>
+</file>
+
+<file path=ppt/notesSlides/notesSlide3.xml><?xml version="1.0" encoding="utf-8"?>
+<p:notes xmlns:a="http://schemas.openxmlformats.org/drawingml/2006/main" xmlns:r="http://schemas.openxmlformats.org/officeDocument/2006/relationships" xmlns:p="http://schemas.openxmlformats.org/presentationml/2006/main">
+  <p:cSld>
+    <p:spTree>
+      <p:nvGrpSpPr>
+        <p:cNvPr id="1" name=""/>
+        <p:cNvGrpSpPr/>
+        <p:nvPr/>
+      </p:nvGrpSpPr>
+      <p:grpSpPr>
+        <a:xfrm>
+          <a:off x="0" y="0"/>
+          <a:ext cx="0" cy="0"/>
+          <a:chOff x="0" y="0"/>
+          <a:chExt cx="0" cy="0"/>
+        </a:xfrm>
+      </p:grpSpPr>
+      <p:sp>
+        <p:nvSpPr>
+          <p:cNvPr id="2" name="Slide Image Placeholder 1"/>
+          <p:cNvSpPr>
+            <a:spLocks noGrp="1" noRot="1" noChangeAspect="1"/>
+          </p:cNvSpPr>
+          <p:nvPr>
+            <p:ph type="sldImg"/>
+          </p:nvPr>
+        </p:nvSpPr>
+        <p:spPr/>
+      </p:sp>
+      <p:sp>
+        <p:nvSpPr>
+          <p:cNvPr id="3" name="Notes Placeholder 2"/>
+          <p:cNvSpPr>
+            <a:spLocks noGrp="1"/>
+          </p:cNvSpPr>
+          <p:nvPr>
+            <p:ph type="body" idx="1"/>
+          </p:nvPr>
+        </p:nvSpPr>
+        <p:spPr/>
+        <p:txBody>
+          <a:bodyPr/>
+          <a:lstStyle/>
+          <a:p>
+            <a:endParaRPr lang="en-GB" dirty="0"/>
+          </a:p>
+        </p:txBody>
+      </p:sp>
+      <p:sp>
+        <p:nvSpPr>
+          <p:cNvPr id="4" name="Slide Number Placeholder 3"/>
+          <p:cNvSpPr>
+            <a:spLocks noGrp="1"/>
+          </p:cNvSpPr>
+          <p:nvPr>
+            <p:ph type="sldNum" sz="quarter" idx="5"/>
+          </p:nvPr>
+        </p:nvSpPr>
+        <p:spPr/>
+        <p:txBody>
+          <a:bodyPr/>
+          <a:lstStyle/>
+          <a:p>
+            <a:fld id="{485BF608-1CF3-7940-8667-CE6C14C5B088}" type="slidenum">
+              <a:rPr lang="en-GB" smtClean="0"/>
+              <a:t>13</a:t>
+            </a:fld>
+            <a:endParaRPr lang="en-GB"/>
+          </a:p>
+        </p:txBody>
+      </p:sp>
+    </p:spTree>
+    <p:extLst>
+      <p:ext uri="{BB962C8B-B14F-4D97-AF65-F5344CB8AC3E}">
+        <p14:creationId xmlns:p14="http://schemas.microsoft.com/office/powerpoint/2010/main" val="3256353367"/>
+      </p:ext>
+    </p:extLst>
+  </p:cSld>
+  <p:clrMapOvr>
+    <a:masterClrMapping/>
+  </p:clrMapOvr>
+</p:notes>
+</file>
+
 <file path=ppt/slideLayouts/slideLayout1.xml><?xml version="1.0" encoding="utf-8"?>
 <p:sldLayout xmlns:a="http://schemas.openxmlformats.org/drawingml/2006/main" xmlns:r="http://schemas.openxmlformats.org/officeDocument/2006/relationships" xmlns:p="http://schemas.openxmlformats.org/presentationml/2006/main" type="title" preserve="1">
   <p:cSld name="Title Slide">
@@ -268,7 +875,7 @@
           <a:p>
             <a:fld id="{08C1035D-8CA6-4748-93CD-5DDB1972CCBE}" type="datetimeFigureOut">
               <a:rPr lang="en-GB" smtClean="0"/>
-              <a:t>25/04/2024</a:t>
+              <a:t>01/05/2024</a:t>
             </a:fld>
             <a:endParaRPr lang="en-GB"/>
           </a:p>
@@ -466,7 +1073,7 @@
           <a:p>
             <a:fld id="{08C1035D-8CA6-4748-93CD-5DDB1972CCBE}" type="datetimeFigureOut">
               <a:rPr lang="en-GB" smtClean="0"/>
-              <a:t>25/04/2024</a:t>
+              <a:t>01/05/2024</a:t>
             </a:fld>
             <a:endParaRPr lang="en-GB"/>
           </a:p>
@@ -674,7 +1281,7 @@
           <a:p>
             <a:fld id="{08C1035D-8CA6-4748-93CD-5DDB1972CCBE}" type="datetimeFigureOut">
               <a:rPr lang="en-GB" smtClean="0"/>
-              <a:t>25/04/2024</a:t>
+              <a:t>01/05/2024</a:t>
             </a:fld>
             <a:endParaRPr lang="en-GB"/>
           </a:p>
@@ -872,7 +1479,7 @@
           <a:p>
             <a:fld id="{08C1035D-8CA6-4748-93CD-5DDB1972CCBE}" type="datetimeFigureOut">
               <a:rPr lang="en-GB" smtClean="0"/>
-              <a:t>25/04/2024</a:t>
+              <a:t>01/05/2024</a:t>
             </a:fld>
             <a:endParaRPr lang="en-GB"/>
           </a:p>
@@ -1147,7 +1754,7 @@
           <a:p>
             <a:fld id="{08C1035D-8CA6-4748-93CD-5DDB1972CCBE}" type="datetimeFigureOut">
               <a:rPr lang="en-GB" smtClean="0"/>
-              <a:t>25/04/2024</a:t>
+              <a:t>01/05/2024</a:t>
             </a:fld>
             <a:endParaRPr lang="en-GB"/>
           </a:p>
@@ -1412,7 +2019,7 @@
           <a:p>
             <a:fld id="{08C1035D-8CA6-4748-93CD-5DDB1972CCBE}" type="datetimeFigureOut">
               <a:rPr lang="en-GB" smtClean="0"/>
-              <a:t>25/04/2024</a:t>
+              <a:t>01/05/2024</a:t>
             </a:fld>
             <a:endParaRPr lang="en-GB"/>
           </a:p>
@@ -1824,7 +2431,7 @@
           <a:p>
             <a:fld id="{08C1035D-8CA6-4748-93CD-5DDB1972CCBE}" type="datetimeFigureOut">
               <a:rPr lang="en-GB" smtClean="0"/>
-              <a:t>25/04/2024</a:t>
+              <a:t>01/05/2024</a:t>
             </a:fld>
             <a:endParaRPr lang="en-GB"/>
           </a:p>
@@ -1965,7 +2572,7 @@
           <a:p>
             <a:fld id="{08C1035D-8CA6-4748-93CD-5DDB1972CCBE}" type="datetimeFigureOut">
               <a:rPr lang="en-GB" smtClean="0"/>
-              <a:t>25/04/2024</a:t>
+              <a:t>01/05/2024</a:t>
             </a:fld>
             <a:endParaRPr lang="en-GB"/>
           </a:p>
@@ -2078,7 +2685,7 @@
           <a:p>
             <a:fld id="{08C1035D-8CA6-4748-93CD-5DDB1972CCBE}" type="datetimeFigureOut">
               <a:rPr lang="en-GB" smtClean="0"/>
-              <a:t>25/04/2024</a:t>
+              <a:t>01/05/2024</a:t>
             </a:fld>
             <a:endParaRPr lang="en-GB"/>
           </a:p>
@@ -2389,7 +2996,7 @@
           <a:p>
             <a:fld id="{08C1035D-8CA6-4748-93CD-5DDB1972CCBE}" type="datetimeFigureOut">
               <a:rPr lang="en-GB" smtClean="0"/>
-              <a:t>25/04/2024</a:t>
+              <a:t>01/05/2024</a:t>
             </a:fld>
             <a:endParaRPr lang="en-GB"/>
           </a:p>
@@ -2677,7 +3284,7 @@
           <a:p>
             <a:fld id="{08C1035D-8CA6-4748-93CD-5DDB1972CCBE}" type="datetimeFigureOut">
               <a:rPr lang="en-GB" smtClean="0"/>
-              <a:t>25/04/2024</a:t>
+              <a:t>01/05/2024</a:t>
             </a:fld>
             <a:endParaRPr lang="en-GB"/>
           </a:p>
@@ -2918,7 +3525,7 @@
           <a:p>
             <a:fld id="{08C1035D-8CA6-4748-93CD-5DDB1972CCBE}" type="datetimeFigureOut">
               <a:rPr lang="en-GB" smtClean="0"/>
-              <a:t>25/04/2024</a:t>
+              <a:t>01/05/2024</a:t>
             </a:fld>
             <a:endParaRPr lang="en-GB"/>
           </a:p>
@@ -3578,6 +4185,1703 @@
     <p:extLst>
       <p:ext uri="{BB962C8B-B14F-4D97-AF65-F5344CB8AC3E}">
         <p14:creationId xmlns:p14="http://schemas.microsoft.com/office/powerpoint/2010/main" val="22674240"/>
+      </p:ext>
+    </p:extLst>
+  </p:cSld>
+  <p:clrMapOvr>
+    <a:masterClrMapping/>
+  </p:clrMapOvr>
+</p:sld>
+</file>
+
+<file path=ppt/slides/slide11.xml><?xml version="1.0" encoding="utf-8"?>
+<p:sld xmlns:a="http://schemas.openxmlformats.org/drawingml/2006/main" xmlns:r="http://schemas.openxmlformats.org/officeDocument/2006/relationships" xmlns:p="http://schemas.openxmlformats.org/presentationml/2006/main">
+  <p:cSld>
+    <p:spTree>
+      <p:nvGrpSpPr>
+        <p:cNvPr id="1" name=""/>
+        <p:cNvGrpSpPr/>
+        <p:nvPr/>
+      </p:nvGrpSpPr>
+      <p:grpSpPr>
+        <a:xfrm>
+          <a:off x="0" y="0"/>
+          <a:ext cx="0" cy="0"/>
+          <a:chOff x="0" y="0"/>
+          <a:chExt cx="0" cy="0"/>
+        </a:xfrm>
+      </p:grpSpPr>
+      <p:sp>
+        <p:nvSpPr>
+          <p:cNvPr id="2" name="Title 1">
+            <a:extLst>
+              <a:ext uri="{FF2B5EF4-FFF2-40B4-BE49-F238E27FC236}">
+                <a16:creationId xmlns:a16="http://schemas.microsoft.com/office/drawing/2014/main" id="{1D26B4C2-A68F-618E-7966-6B3F05A91103}"/>
+              </a:ext>
+            </a:extLst>
+          </p:cNvPr>
+          <p:cNvSpPr>
+            <a:spLocks noGrp="1"/>
+          </p:cNvSpPr>
+          <p:nvPr>
+            <p:ph type="title"/>
+          </p:nvPr>
+        </p:nvSpPr>
+        <p:spPr/>
+        <p:txBody>
+          <a:bodyPr/>
+          <a:lstStyle/>
+          <a:p>
+            <a:r>
+              <a:rPr lang="en-GB" dirty="0"/>
+              <a:t>Dynamics/Equilibrium</a:t>
+            </a:r>
+          </a:p>
+        </p:txBody>
+      </p:sp>
+      <p:sp>
+        <p:nvSpPr>
+          <p:cNvPr id="3" name="Content Placeholder 2">
+            <a:extLst>
+              <a:ext uri="{FF2B5EF4-FFF2-40B4-BE49-F238E27FC236}">
+                <a16:creationId xmlns:a16="http://schemas.microsoft.com/office/drawing/2014/main" id="{BDAB8D9C-E2AF-57F7-21A8-46EE2FE64318}"/>
+              </a:ext>
+            </a:extLst>
+          </p:cNvPr>
+          <p:cNvSpPr>
+            <a:spLocks noGrp="1"/>
+          </p:cNvSpPr>
+          <p:nvPr>
+            <p:ph idx="1"/>
+          </p:nvPr>
+        </p:nvSpPr>
+        <p:spPr>
+          <a:xfrm>
+            <a:off x="591065" y="1541420"/>
+            <a:ext cx="4920346" cy="4351338"/>
+          </a:xfrm>
+        </p:spPr>
+        <p:txBody>
+          <a:bodyPr>
+            <a:normAutofit fontScale="77500" lnSpcReduction="20000"/>
+          </a:bodyPr>
+          <a:lstStyle/>
+          <a:p>
+            <a:r>
+              <a:rPr lang="en-GB" dirty="0"/>
+              <a:t>Extend timeframe up until 2100</a:t>
+            </a:r>
+          </a:p>
+          <a:p>
+            <a:r>
+              <a:rPr lang="en-GB" dirty="0"/>
+              <a:t>Consider flows – equilibrium is seen if flow =0 or is constant over time</a:t>
+            </a:r>
+          </a:p>
+          <a:p>
+            <a:r>
+              <a:rPr lang="en-GB" dirty="0"/>
+              <a:t>Consider progression flow – new active TB cases</a:t>
+            </a:r>
+          </a:p>
+          <a:p>
+            <a:r>
+              <a:rPr lang="en-GB" dirty="0"/>
+              <a:t>Although zoomed out it appears stable from around year 2060 – technically not in equilibrium as there is a slight decrease year on year</a:t>
+            </a:r>
+          </a:p>
+          <a:p>
+            <a:r>
+              <a:rPr lang="en-GB" dirty="0"/>
+              <a:t>Likely that if the system remains as is, it may eventually reach equilibrium when progression reaches 0 – however this would likely require several hundred if not thousands of years</a:t>
+            </a:r>
+          </a:p>
+        </p:txBody>
+      </p:sp>
+      <p:pic>
+        <p:nvPicPr>
+          <p:cNvPr id="4" name="Picture 3">
+            <a:extLst>
+              <a:ext uri="{FF2B5EF4-FFF2-40B4-BE49-F238E27FC236}">
+                <a16:creationId xmlns:a16="http://schemas.microsoft.com/office/drawing/2014/main" id="{61A9BB7C-5FEA-5345-0510-E19C8843ED4C}"/>
+              </a:ext>
+            </a:extLst>
+          </p:cNvPr>
+          <p:cNvPicPr>
+            <a:picLocks noChangeAspect="1"/>
+          </p:cNvPicPr>
+          <p:nvPr/>
+        </p:nvPicPr>
+        <p:blipFill>
+          <a:blip r:embed="rId3"/>
+          <a:stretch>
+            <a:fillRect/>
+          </a:stretch>
+        </p:blipFill>
+        <p:spPr>
+          <a:xfrm>
+            <a:off x="6201512" y="323169"/>
+            <a:ext cx="5497003" cy="3013982"/>
+          </a:xfrm>
+          <a:prstGeom prst="rect">
+            <a:avLst/>
+          </a:prstGeom>
+        </p:spPr>
+      </p:pic>
+      <p:graphicFrame>
+        <p:nvGraphicFramePr>
+          <p:cNvPr id="5" name="Table 4">
+            <a:extLst>
+              <a:ext uri="{FF2B5EF4-FFF2-40B4-BE49-F238E27FC236}">
+                <a16:creationId xmlns:a16="http://schemas.microsoft.com/office/drawing/2014/main" id="{82D52A69-8EC2-CA6E-D261-62A1ECFFB0B8}"/>
+              </a:ext>
+            </a:extLst>
+          </p:cNvPr>
+          <p:cNvGraphicFramePr>
+            <a:graphicFrameLocks noGrp="1"/>
+          </p:cNvGraphicFramePr>
+          <p:nvPr>
+            <p:extLst>
+              <p:ext uri="{D42A27DB-BD31-4B8C-83A1-F6EECF244321}">
+                <p14:modId xmlns:p14="http://schemas.microsoft.com/office/powerpoint/2010/main" val="384720062"/>
+              </p:ext>
+            </p:extLst>
+          </p:nvPr>
+        </p:nvGraphicFramePr>
+        <p:xfrm>
+          <a:off x="6433454" y="3852089"/>
+          <a:ext cx="4920346" cy="2821320"/>
+        </p:xfrm>
+        <a:graphic>
+          <a:graphicData uri="http://schemas.openxmlformats.org/drawingml/2006/table">
+            <a:tbl>
+              <a:tblPr firstRow="1" bandRow="1">
+                <a:tableStyleId>{5C22544A-7EE6-4342-B048-85BDC9FD1C3A}</a:tableStyleId>
+              </a:tblPr>
+              <a:tblGrid>
+                <a:gridCol w="2460173">
+                  <a:extLst>
+                    <a:ext uri="{9D8B030D-6E8A-4147-A177-3AD203B41FA5}">
+                      <a16:colId xmlns:a16="http://schemas.microsoft.com/office/drawing/2014/main" val="1908465027"/>
+                    </a:ext>
+                  </a:extLst>
+                </a:gridCol>
+                <a:gridCol w="2460173">
+                  <a:extLst>
+                    <a:ext uri="{9D8B030D-6E8A-4147-A177-3AD203B41FA5}">
+                      <a16:colId xmlns:a16="http://schemas.microsoft.com/office/drawing/2014/main" val="544226445"/>
+                    </a:ext>
+                  </a:extLst>
+                </a:gridCol>
+              </a:tblGrid>
+              <a:tr h="436248">
+                <a:tc>
+                  <a:txBody>
+                    <a:bodyPr/>
+                    <a:lstStyle/>
+                    <a:p>
+                      <a:r>
+                        <a:rPr lang="en-GB" dirty="0"/>
+                        <a:t>Year</a:t>
+                      </a:r>
+                    </a:p>
+                  </a:txBody>
+                  <a:tcPr/>
+                </a:tc>
+                <a:tc>
+                  <a:txBody>
+                    <a:bodyPr/>
+                    <a:lstStyle/>
+                    <a:p>
+                      <a:r>
+                        <a:rPr lang="en-GB" dirty="0"/>
+                        <a:t>Progression (people/year)</a:t>
+                      </a:r>
+                    </a:p>
+                  </a:txBody>
+                  <a:tcPr/>
+                </a:tc>
+                <a:extLst>
+                  <a:ext uri="{0D108BD9-81ED-4DB2-BD59-A6C34878D82A}">
+                    <a16:rowId xmlns:a16="http://schemas.microsoft.com/office/drawing/2014/main" val="2545763126"/>
+                  </a:ext>
+                </a:extLst>
+              </a:tr>
+              <a:tr h="436248">
+                <a:tc>
+                  <a:txBody>
+                    <a:bodyPr/>
+                    <a:lstStyle/>
+                    <a:p>
+                      <a:r>
+                        <a:rPr lang="en-GB" dirty="0"/>
+                        <a:t>2060</a:t>
+                      </a:r>
+                    </a:p>
+                  </a:txBody>
+                  <a:tcPr/>
+                </a:tc>
+                <a:tc>
+                  <a:txBody>
+                    <a:bodyPr/>
+                    <a:lstStyle/>
+                    <a:p>
+                      <a:r>
+                        <a:rPr lang="en-GB" dirty="0"/>
+                        <a:t>31 173</a:t>
+                      </a:r>
+                    </a:p>
+                  </a:txBody>
+                  <a:tcPr/>
+                </a:tc>
+                <a:extLst>
+                  <a:ext uri="{0D108BD9-81ED-4DB2-BD59-A6C34878D82A}">
+                    <a16:rowId xmlns:a16="http://schemas.microsoft.com/office/drawing/2014/main" val="889517260"/>
+                  </a:ext>
+                </a:extLst>
+              </a:tr>
+              <a:tr h="436248">
+                <a:tc>
+                  <a:txBody>
+                    <a:bodyPr/>
+                    <a:lstStyle/>
+                    <a:p>
+                      <a:r>
+                        <a:rPr lang="en-GB" dirty="0"/>
+                        <a:t>2070</a:t>
+                      </a:r>
+                    </a:p>
+                  </a:txBody>
+                  <a:tcPr/>
+                </a:tc>
+                <a:tc>
+                  <a:txBody>
+                    <a:bodyPr/>
+                    <a:lstStyle/>
+                    <a:p>
+                      <a:r>
+                        <a:rPr lang="en-GB" dirty="0"/>
+                        <a:t>29 469</a:t>
+                      </a:r>
+                    </a:p>
+                  </a:txBody>
+                  <a:tcPr/>
+                </a:tc>
+                <a:extLst>
+                  <a:ext uri="{0D108BD9-81ED-4DB2-BD59-A6C34878D82A}">
+                    <a16:rowId xmlns:a16="http://schemas.microsoft.com/office/drawing/2014/main" val="1857197193"/>
+                  </a:ext>
+                </a:extLst>
+              </a:tr>
+              <a:tr h="436248">
+                <a:tc>
+                  <a:txBody>
+                    <a:bodyPr/>
+                    <a:lstStyle/>
+                    <a:p>
+                      <a:r>
+                        <a:rPr lang="en-GB" dirty="0"/>
+                        <a:t>2080</a:t>
+                      </a:r>
+                    </a:p>
+                  </a:txBody>
+                  <a:tcPr/>
+                </a:tc>
+                <a:tc>
+                  <a:txBody>
+                    <a:bodyPr/>
+                    <a:lstStyle/>
+                    <a:p>
+                      <a:r>
+                        <a:rPr lang="en-GB" dirty="0"/>
+                        <a:t>28 672</a:t>
+                      </a:r>
+                    </a:p>
+                  </a:txBody>
+                  <a:tcPr/>
+                </a:tc>
+                <a:extLst>
+                  <a:ext uri="{0D108BD9-81ED-4DB2-BD59-A6C34878D82A}">
+                    <a16:rowId xmlns:a16="http://schemas.microsoft.com/office/drawing/2014/main" val="2431420667"/>
+                  </a:ext>
+                </a:extLst>
+              </a:tr>
+              <a:tr h="436248">
+                <a:tc>
+                  <a:txBody>
+                    <a:bodyPr/>
+                    <a:lstStyle/>
+                    <a:p>
+                      <a:r>
+                        <a:rPr lang="en-GB" dirty="0"/>
+                        <a:t>2090</a:t>
+                      </a:r>
+                    </a:p>
+                  </a:txBody>
+                  <a:tcPr/>
+                </a:tc>
+                <a:tc>
+                  <a:txBody>
+                    <a:bodyPr/>
+                    <a:lstStyle/>
+                    <a:p>
+                      <a:r>
+                        <a:rPr lang="en-GB" dirty="0"/>
+                        <a:t>28 158</a:t>
+                      </a:r>
+                    </a:p>
+                  </a:txBody>
+                  <a:tcPr/>
+                </a:tc>
+                <a:extLst>
+                  <a:ext uri="{0D108BD9-81ED-4DB2-BD59-A6C34878D82A}">
+                    <a16:rowId xmlns:a16="http://schemas.microsoft.com/office/drawing/2014/main" val="3999017943"/>
+                  </a:ext>
+                </a:extLst>
+              </a:tr>
+              <a:tr h="436248">
+                <a:tc>
+                  <a:txBody>
+                    <a:bodyPr/>
+                    <a:lstStyle/>
+                    <a:p>
+                      <a:r>
+                        <a:rPr lang="en-GB" dirty="0"/>
+                        <a:t>2100</a:t>
+                      </a:r>
+                    </a:p>
+                  </a:txBody>
+                  <a:tcPr/>
+                </a:tc>
+                <a:tc>
+                  <a:txBody>
+                    <a:bodyPr/>
+                    <a:lstStyle/>
+                    <a:p>
+                      <a:r>
+                        <a:rPr lang="en-GB" dirty="0"/>
+                        <a:t>27 711</a:t>
+                      </a:r>
+                    </a:p>
+                  </a:txBody>
+                  <a:tcPr/>
+                </a:tc>
+                <a:extLst>
+                  <a:ext uri="{0D108BD9-81ED-4DB2-BD59-A6C34878D82A}">
+                    <a16:rowId xmlns:a16="http://schemas.microsoft.com/office/drawing/2014/main" val="2020558620"/>
+                  </a:ext>
+                </a:extLst>
+              </a:tr>
+            </a:tbl>
+          </a:graphicData>
+        </a:graphic>
+      </p:graphicFrame>
+    </p:spTree>
+    <p:extLst>
+      <p:ext uri="{BB962C8B-B14F-4D97-AF65-F5344CB8AC3E}">
+        <p14:creationId xmlns:p14="http://schemas.microsoft.com/office/powerpoint/2010/main" val="2731473407"/>
+      </p:ext>
+    </p:extLst>
+  </p:cSld>
+  <p:clrMapOvr>
+    <a:masterClrMapping/>
+  </p:clrMapOvr>
+</p:sld>
+</file>
+
+<file path=ppt/slides/slide12.xml><?xml version="1.0" encoding="utf-8"?>
+<p:sld xmlns:a="http://schemas.openxmlformats.org/drawingml/2006/main" xmlns:r="http://schemas.openxmlformats.org/officeDocument/2006/relationships" xmlns:p="http://schemas.openxmlformats.org/presentationml/2006/main">
+  <p:cSld>
+    <p:spTree>
+      <p:nvGrpSpPr>
+        <p:cNvPr id="1" name=""/>
+        <p:cNvGrpSpPr/>
+        <p:nvPr/>
+      </p:nvGrpSpPr>
+      <p:grpSpPr>
+        <a:xfrm>
+          <a:off x="0" y="0"/>
+          <a:ext cx="0" cy="0"/>
+          <a:chOff x="0" y="0"/>
+          <a:chExt cx="0" cy="0"/>
+        </a:xfrm>
+      </p:grpSpPr>
+      <p:sp>
+        <p:nvSpPr>
+          <p:cNvPr id="2" name="Title 1">
+            <a:extLst>
+              <a:ext uri="{FF2B5EF4-FFF2-40B4-BE49-F238E27FC236}">
+                <a16:creationId xmlns:a16="http://schemas.microsoft.com/office/drawing/2014/main" id="{F03BF685-9974-0851-5030-9731672431B8}"/>
+              </a:ext>
+            </a:extLst>
+          </p:cNvPr>
+          <p:cNvSpPr>
+            <a:spLocks noGrp="1"/>
+          </p:cNvSpPr>
+          <p:nvPr>
+            <p:ph type="title"/>
+          </p:nvPr>
+        </p:nvSpPr>
+        <p:spPr>
+          <a:xfrm>
+            <a:off x="838200" y="365125"/>
+            <a:ext cx="10515600" cy="685199"/>
+          </a:xfrm>
+        </p:spPr>
+        <p:txBody>
+          <a:bodyPr>
+            <a:normAutofit fontScale="90000"/>
+          </a:bodyPr>
+          <a:lstStyle/>
+          <a:p>
+            <a:r>
+              <a:rPr lang="en-GB" dirty="0"/>
+              <a:t>Exp1: Increasing case detection rates</a:t>
+            </a:r>
+          </a:p>
+        </p:txBody>
+      </p:sp>
+      <p:sp>
+        <p:nvSpPr>
+          <p:cNvPr id="3" name="Content Placeholder 2">
+            <a:extLst>
+              <a:ext uri="{FF2B5EF4-FFF2-40B4-BE49-F238E27FC236}">
+                <a16:creationId xmlns:a16="http://schemas.microsoft.com/office/drawing/2014/main" id="{94A4FCA8-ED61-2CF8-5155-B49C7876DF58}"/>
+              </a:ext>
+            </a:extLst>
+          </p:cNvPr>
+          <p:cNvSpPr>
+            <a:spLocks noGrp="1"/>
+          </p:cNvSpPr>
+          <p:nvPr>
+            <p:ph idx="1"/>
+          </p:nvPr>
+        </p:nvSpPr>
+        <p:spPr>
+          <a:xfrm>
+            <a:off x="437978" y="1507524"/>
+            <a:ext cx="11518556" cy="1482811"/>
+          </a:xfrm>
+        </p:spPr>
+        <p:txBody>
+          <a:bodyPr/>
+          <a:lstStyle/>
+          <a:p>
+            <a:r>
+              <a:rPr lang="en-GB" dirty="0"/>
+              <a:t>Consider the effect of increasing case detection rates over the next two decades (year 2041) on the total TB deaths, cumulative cases and progression (new cases)</a:t>
+            </a:r>
+          </a:p>
+        </p:txBody>
+      </p:sp>
+      <p:graphicFrame>
+        <p:nvGraphicFramePr>
+          <p:cNvPr id="4" name="Table 3">
+            <a:extLst>
+              <a:ext uri="{FF2B5EF4-FFF2-40B4-BE49-F238E27FC236}">
+                <a16:creationId xmlns:a16="http://schemas.microsoft.com/office/drawing/2014/main" id="{4A6957CC-D1A7-6FFD-C4A7-6D34FC9102D2}"/>
+              </a:ext>
+            </a:extLst>
+          </p:cNvPr>
+          <p:cNvGraphicFramePr>
+            <a:graphicFrameLocks noGrp="1"/>
+          </p:cNvGraphicFramePr>
+          <p:nvPr>
+            <p:extLst>
+              <p:ext uri="{D42A27DB-BD31-4B8C-83A1-F6EECF244321}">
+                <p14:modId xmlns:p14="http://schemas.microsoft.com/office/powerpoint/2010/main" val="1532000"/>
+              </p:ext>
+            </p:extLst>
+          </p:nvPr>
+        </p:nvGraphicFramePr>
+        <p:xfrm>
+          <a:off x="803873" y="2990335"/>
+          <a:ext cx="11152661" cy="3510280"/>
+        </p:xfrm>
+        <a:graphic>
+          <a:graphicData uri="http://schemas.openxmlformats.org/drawingml/2006/table">
+            <a:tbl>
+              <a:tblPr firstRow="1" bandRow="1">
+                <a:tableStyleId>{5C22544A-7EE6-4342-B048-85BDC9FD1C3A}</a:tableStyleId>
+              </a:tblPr>
+              <a:tblGrid>
+                <a:gridCol w="1209959">
+                  <a:extLst>
+                    <a:ext uri="{9D8B030D-6E8A-4147-A177-3AD203B41FA5}">
+                      <a16:colId xmlns:a16="http://schemas.microsoft.com/office/drawing/2014/main" val="3621459278"/>
+                    </a:ext>
+                  </a:extLst>
+                </a:gridCol>
+                <a:gridCol w="1318016">
+                  <a:extLst>
+                    <a:ext uri="{9D8B030D-6E8A-4147-A177-3AD203B41FA5}">
+                      <a16:colId xmlns:a16="http://schemas.microsoft.com/office/drawing/2014/main" val="314930670"/>
+                    </a:ext>
+                  </a:extLst>
+                </a:gridCol>
+                <a:gridCol w="1062091">
+                  <a:extLst>
+                    <a:ext uri="{9D8B030D-6E8A-4147-A177-3AD203B41FA5}">
+                      <a16:colId xmlns:a16="http://schemas.microsoft.com/office/drawing/2014/main" val="1030920375"/>
+                    </a:ext>
+                  </a:extLst>
+                </a:gridCol>
+                <a:gridCol w="1062091">
+                  <a:extLst>
+                    <a:ext uri="{9D8B030D-6E8A-4147-A177-3AD203B41FA5}">
+                      <a16:colId xmlns:a16="http://schemas.microsoft.com/office/drawing/2014/main" val="3860373863"/>
+                    </a:ext>
+                  </a:extLst>
+                </a:gridCol>
+                <a:gridCol w="1829866">
+                  <a:extLst>
+                    <a:ext uri="{9D8B030D-6E8A-4147-A177-3AD203B41FA5}">
+                      <a16:colId xmlns:a16="http://schemas.microsoft.com/office/drawing/2014/main" val="1755533279"/>
+                    </a:ext>
+                  </a:extLst>
+                </a:gridCol>
+                <a:gridCol w="1445979">
+                  <a:extLst>
+                    <a:ext uri="{9D8B030D-6E8A-4147-A177-3AD203B41FA5}">
+                      <a16:colId xmlns:a16="http://schemas.microsoft.com/office/drawing/2014/main" val="2830561784"/>
+                    </a:ext>
+                  </a:extLst>
+                </a:gridCol>
+                <a:gridCol w="1177257">
+                  <a:extLst>
+                    <a:ext uri="{9D8B030D-6E8A-4147-A177-3AD203B41FA5}">
+                      <a16:colId xmlns:a16="http://schemas.microsoft.com/office/drawing/2014/main" val="1762253425"/>
+                    </a:ext>
+                  </a:extLst>
+                </a:gridCol>
+                <a:gridCol w="2047402">
+                  <a:extLst>
+                    <a:ext uri="{9D8B030D-6E8A-4147-A177-3AD203B41FA5}">
+                      <a16:colId xmlns:a16="http://schemas.microsoft.com/office/drawing/2014/main" val="3713535765"/>
+                    </a:ext>
+                  </a:extLst>
+                </a:gridCol>
+              </a:tblGrid>
+              <a:tr h="370840">
+                <a:tc>
+                  <a:txBody>
+                    <a:bodyPr/>
+                    <a:lstStyle/>
+                    <a:p>
+                      <a:r>
+                        <a:rPr lang="en-GB" dirty="0"/>
+                        <a:t>Scenario (CDR increase)</a:t>
+                      </a:r>
+                    </a:p>
+                  </a:txBody>
+                  <a:tcPr/>
+                </a:tc>
+                <a:tc>
+                  <a:txBody>
+                    <a:bodyPr/>
+                    <a:lstStyle/>
+                    <a:p>
+                      <a:r>
+                        <a:rPr lang="en-GB" dirty="0"/>
+                        <a:t>Case Detection Rate (%)</a:t>
+                      </a:r>
+                    </a:p>
+                  </a:txBody>
+                  <a:tcPr/>
+                </a:tc>
+                <a:tc>
+                  <a:txBody>
+                    <a:bodyPr/>
+                    <a:lstStyle/>
+                    <a:p>
+                      <a:r>
+                        <a:rPr lang="en-GB" dirty="0"/>
+                        <a:t>Total TB Deaths</a:t>
+                      </a:r>
+                    </a:p>
+                  </a:txBody>
+                  <a:tcPr/>
+                </a:tc>
+                <a:tc>
+                  <a:txBody>
+                    <a:bodyPr/>
+                    <a:lstStyle/>
+                    <a:p>
+                      <a:r>
+                        <a:rPr lang="en-GB" dirty="0"/>
+                        <a:t>TB deaths averted</a:t>
+                      </a:r>
+                    </a:p>
+                  </a:txBody>
+                  <a:tcPr/>
+                </a:tc>
+                <a:tc>
+                  <a:txBody>
+                    <a:bodyPr/>
+                    <a:lstStyle/>
+                    <a:p>
+                      <a:r>
+                        <a:rPr lang="en-GB" dirty="0"/>
+                        <a:t>TB deaths 2041 </a:t>
+                      </a:r>
+                    </a:p>
+                    <a:p>
+                      <a:r>
+                        <a:rPr lang="en-GB" dirty="0"/>
+                        <a:t>(% change from baseline)</a:t>
+                      </a:r>
+                    </a:p>
+                  </a:txBody>
+                  <a:tcPr/>
+                </a:tc>
+                <a:tc>
+                  <a:txBody>
+                    <a:bodyPr/>
+                    <a:lstStyle/>
+                    <a:p>
+                      <a:r>
+                        <a:rPr lang="en-GB" dirty="0"/>
+                        <a:t>Cumulative Cases</a:t>
+                      </a:r>
+                    </a:p>
+                  </a:txBody>
+                  <a:tcPr/>
+                </a:tc>
+                <a:tc>
+                  <a:txBody>
+                    <a:bodyPr/>
+                    <a:lstStyle/>
+                    <a:p>
+                      <a:r>
+                        <a:rPr lang="en-GB" dirty="0"/>
+                        <a:t>Cases Averted</a:t>
+                      </a:r>
+                    </a:p>
+                  </a:txBody>
+                  <a:tcPr/>
+                </a:tc>
+                <a:tc>
+                  <a:txBody>
+                    <a:bodyPr/>
+                    <a:lstStyle/>
+                    <a:p>
+                      <a:r>
+                        <a:rPr lang="en-GB" dirty="0"/>
+                        <a:t>New Cases in 2041 (% change from baseline)</a:t>
+                      </a:r>
+                    </a:p>
+                  </a:txBody>
+                  <a:tcPr/>
+                </a:tc>
+                <a:extLst>
+                  <a:ext uri="{0D108BD9-81ED-4DB2-BD59-A6C34878D82A}">
+                    <a16:rowId xmlns:a16="http://schemas.microsoft.com/office/drawing/2014/main" val="2349497303"/>
+                  </a:ext>
+                </a:extLst>
+              </a:tr>
+              <a:tr h="370840">
+                <a:tc>
+                  <a:txBody>
+                    <a:bodyPr/>
+                    <a:lstStyle/>
+                    <a:p>
+                      <a:r>
+                        <a:rPr lang="en-GB" dirty="0"/>
+                        <a:t>Baseline</a:t>
+                      </a:r>
+                    </a:p>
+                  </a:txBody>
+                  <a:tcPr/>
+                </a:tc>
+                <a:tc>
+                  <a:txBody>
+                    <a:bodyPr/>
+                    <a:lstStyle/>
+                    <a:p>
+                      <a:r>
+                        <a:rPr lang="en-GB" dirty="0"/>
+                        <a:t>57</a:t>
+                      </a:r>
+                    </a:p>
+                  </a:txBody>
+                  <a:tcPr/>
+                </a:tc>
+                <a:tc>
+                  <a:txBody>
+                    <a:bodyPr/>
+                    <a:lstStyle/>
+                    <a:p>
+                      <a:r>
+                        <a:rPr lang="en-GB" dirty="0"/>
+                        <a:t>463 512</a:t>
+                      </a:r>
+                    </a:p>
+                  </a:txBody>
+                  <a:tcPr/>
+                </a:tc>
+                <a:tc>
+                  <a:txBody>
+                    <a:bodyPr/>
+                    <a:lstStyle/>
+                    <a:p>
+                      <a:r>
+                        <a:rPr lang="en-GB" dirty="0"/>
+                        <a:t>-</a:t>
+                      </a:r>
+                    </a:p>
+                  </a:txBody>
+                  <a:tcPr/>
+                </a:tc>
+                <a:tc>
+                  <a:txBody>
+                    <a:bodyPr/>
+                    <a:lstStyle/>
+                    <a:p>
+                      <a:r>
+                        <a:rPr lang="en-GB" dirty="0"/>
+                        <a:t>2190 (0%)</a:t>
+                      </a:r>
+                    </a:p>
+                  </a:txBody>
+                  <a:tcPr/>
+                </a:tc>
+                <a:tc>
+                  <a:txBody>
+                    <a:bodyPr/>
+                    <a:lstStyle/>
+                    <a:p>
+                      <a:r>
+                        <a:rPr lang="en-GB" dirty="0"/>
+                        <a:t>5 583 870</a:t>
+                      </a:r>
+                    </a:p>
+                  </a:txBody>
+                  <a:tcPr/>
+                </a:tc>
+                <a:tc>
+                  <a:txBody>
+                    <a:bodyPr/>
+                    <a:lstStyle/>
+                    <a:p>
+                      <a:r>
+                        <a:rPr lang="en-GB" dirty="0"/>
+                        <a:t>-</a:t>
+                      </a:r>
+                    </a:p>
+                  </a:txBody>
+                  <a:tcPr/>
+                </a:tc>
+                <a:tc>
+                  <a:txBody>
+                    <a:bodyPr/>
+                    <a:lstStyle/>
+                    <a:p>
+                      <a:r>
+                        <a:rPr lang="en-GB" dirty="0"/>
+                        <a:t>43 965 (0%)</a:t>
+                      </a:r>
+                    </a:p>
+                  </a:txBody>
+                  <a:tcPr/>
+                </a:tc>
+                <a:extLst>
+                  <a:ext uri="{0D108BD9-81ED-4DB2-BD59-A6C34878D82A}">
+                    <a16:rowId xmlns:a16="http://schemas.microsoft.com/office/drawing/2014/main" val="707549642"/>
+                  </a:ext>
+                </a:extLst>
+              </a:tr>
+              <a:tr h="370840">
+                <a:tc>
+                  <a:txBody>
+                    <a:bodyPr/>
+                    <a:lstStyle/>
+                    <a:p>
+                      <a:r>
+                        <a:rPr lang="en-GB" dirty="0"/>
+                        <a:t>5% </a:t>
+                      </a:r>
+                    </a:p>
+                  </a:txBody>
+                  <a:tcPr/>
+                </a:tc>
+                <a:tc>
+                  <a:txBody>
+                    <a:bodyPr/>
+                    <a:lstStyle/>
+                    <a:p>
+                      <a:r>
+                        <a:rPr lang="en-GB" dirty="0"/>
+                        <a:t>62</a:t>
+                      </a:r>
+                    </a:p>
+                  </a:txBody>
+                  <a:tcPr/>
+                </a:tc>
+                <a:tc>
+                  <a:txBody>
+                    <a:bodyPr/>
+                    <a:lstStyle/>
+                    <a:p>
+                      <a:r>
+                        <a:rPr lang="en-GB" dirty="0"/>
+                        <a:t>457 437</a:t>
+                      </a:r>
+                    </a:p>
+                  </a:txBody>
+                  <a:tcPr/>
+                </a:tc>
+                <a:tc>
+                  <a:txBody>
+                    <a:bodyPr/>
+                    <a:lstStyle/>
+                    <a:p>
+                      <a:r>
+                        <a:rPr lang="en-GB" dirty="0"/>
+                        <a:t>6 075</a:t>
+                      </a:r>
+                    </a:p>
+                  </a:txBody>
+                  <a:tcPr/>
+                </a:tc>
+                <a:tc>
+                  <a:txBody>
+                    <a:bodyPr/>
+                    <a:lstStyle/>
+                    <a:p>
+                      <a:r>
+                        <a:rPr lang="en-GB" dirty="0"/>
+                        <a:t>1825 ( - 16.7%)</a:t>
+                      </a:r>
+                    </a:p>
+                  </a:txBody>
+                  <a:tcPr/>
+                </a:tc>
+                <a:tc>
+                  <a:txBody>
+                    <a:bodyPr/>
+                    <a:lstStyle/>
+                    <a:p>
+                      <a:r>
+                        <a:rPr lang="en-GB" dirty="0"/>
+                        <a:t>5 523 370</a:t>
+                      </a:r>
+                    </a:p>
+                  </a:txBody>
+                  <a:tcPr/>
+                </a:tc>
+                <a:tc>
+                  <a:txBody>
+                    <a:bodyPr/>
+                    <a:lstStyle/>
+                    <a:p>
+                      <a:r>
+                        <a:rPr lang="en-GB" dirty="0"/>
+                        <a:t>60 500</a:t>
+                      </a:r>
+                    </a:p>
+                  </a:txBody>
+                  <a:tcPr/>
+                </a:tc>
+                <a:tc>
+                  <a:txBody>
+                    <a:bodyPr/>
+                    <a:lstStyle/>
+                    <a:p>
+                      <a:r>
+                        <a:rPr lang="en-GB" dirty="0"/>
+                        <a:t>37 427  (-14.9%)</a:t>
+                      </a:r>
+                    </a:p>
+                  </a:txBody>
+                  <a:tcPr/>
+                </a:tc>
+                <a:extLst>
+                  <a:ext uri="{0D108BD9-81ED-4DB2-BD59-A6C34878D82A}">
+                    <a16:rowId xmlns:a16="http://schemas.microsoft.com/office/drawing/2014/main" val="3689555509"/>
+                  </a:ext>
+                </a:extLst>
+              </a:tr>
+              <a:tr h="370840">
+                <a:tc>
+                  <a:txBody>
+                    <a:bodyPr/>
+                    <a:lstStyle/>
+                    <a:p>
+                      <a:pPr marL="0" marR="0" lvl="0" indent="0" algn="l" defTabSz="914400" rtl="0" eaLnBrk="1" fontAlgn="auto" latinLnBrk="0" hangingPunct="1">
+                        <a:lnSpc>
+                          <a:spcPct val="100000"/>
+                        </a:lnSpc>
+                        <a:spcBef>
+                          <a:spcPts val="0"/>
+                        </a:spcBef>
+                        <a:spcAft>
+                          <a:spcPts val="0"/>
+                        </a:spcAft>
+                        <a:buClrTx/>
+                        <a:buSzTx/>
+                        <a:buFontTx/>
+                        <a:buNone/>
+                        <a:tabLst/>
+                        <a:defRPr/>
+                      </a:pPr>
+                      <a:r>
+                        <a:rPr lang="en-GB" dirty="0"/>
+                        <a:t>10% </a:t>
+                      </a:r>
+                    </a:p>
+                  </a:txBody>
+                  <a:tcPr/>
+                </a:tc>
+                <a:tc>
+                  <a:txBody>
+                    <a:bodyPr/>
+                    <a:lstStyle/>
+                    <a:p>
+                      <a:r>
+                        <a:rPr lang="en-GB" dirty="0"/>
+                        <a:t>67</a:t>
+                      </a:r>
+                    </a:p>
+                  </a:txBody>
+                  <a:tcPr/>
+                </a:tc>
+                <a:tc>
+                  <a:txBody>
+                    <a:bodyPr/>
+                    <a:lstStyle/>
+                    <a:p>
+                      <a:r>
+                        <a:rPr lang="en-GB" dirty="0"/>
+                        <a:t>452 332</a:t>
+                      </a:r>
+                    </a:p>
+                  </a:txBody>
+                  <a:tcPr/>
+                </a:tc>
+                <a:tc>
+                  <a:txBody>
+                    <a:bodyPr/>
+                    <a:lstStyle/>
+                    <a:p>
+                      <a:r>
+                        <a:rPr lang="en-GB" dirty="0"/>
+                        <a:t>11 180</a:t>
+                      </a:r>
+                    </a:p>
+                  </a:txBody>
+                  <a:tcPr/>
+                </a:tc>
+                <a:tc>
+                  <a:txBody>
+                    <a:bodyPr/>
+                    <a:lstStyle/>
+                    <a:p>
+                      <a:r>
+                        <a:rPr lang="en-GB" dirty="0"/>
+                        <a:t>1542 (-29.6%)</a:t>
+                      </a:r>
+                    </a:p>
+                  </a:txBody>
+                  <a:tcPr/>
+                </a:tc>
+                <a:tc>
+                  <a:txBody>
+                    <a:bodyPr/>
+                    <a:lstStyle/>
+                    <a:p>
+                      <a:r>
+                        <a:rPr lang="en-GB" dirty="0"/>
+                        <a:t>5 470 900</a:t>
+                      </a:r>
+                    </a:p>
+                  </a:txBody>
+                  <a:tcPr/>
+                </a:tc>
+                <a:tc>
+                  <a:txBody>
+                    <a:bodyPr/>
+                    <a:lstStyle/>
+                    <a:p>
+                      <a:r>
+                        <a:rPr lang="en-GB" dirty="0"/>
+                        <a:t>112 970</a:t>
+                      </a:r>
+                    </a:p>
+                  </a:txBody>
+                  <a:tcPr/>
+                </a:tc>
+                <a:tc>
+                  <a:txBody>
+                    <a:bodyPr/>
+                    <a:lstStyle/>
+                    <a:p>
+                      <a:r>
+                        <a:rPr lang="en-GB" dirty="0"/>
+                        <a:t>32 015 (-27.18%)</a:t>
+                      </a:r>
+                    </a:p>
+                  </a:txBody>
+                  <a:tcPr/>
+                </a:tc>
+                <a:extLst>
+                  <a:ext uri="{0D108BD9-81ED-4DB2-BD59-A6C34878D82A}">
+                    <a16:rowId xmlns:a16="http://schemas.microsoft.com/office/drawing/2014/main" val="3602446438"/>
+                  </a:ext>
+                </a:extLst>
+              </a:tr>
+              <a:tr h="370840">
+                <a:tc>
+                  <a:txBody>
+                    <a:bodyPr/>
+                    <a:lstStyle/>
+                    <a:p>
+                      <a:r>
+                        <a:rPr lang="en-GB" dirty="0"/>
+                        <a:t>20%</a:t>
+                      </a:r>
+                    </a:p>
+                  </a:txBody>
+                  <a:tcPr/>
+                </a:tc>
+                <a:tc>
+                  <a:txBody>
+                    <a:bodyPr/>
+                    <a:lstStyle/>
+                    <a:p>
+                      <a:r>
+                        <a:rPr lang="en-GB" dirty="0"/>
+                        <a:t>77</a:t>
+                      </a:r>
+                    </a:p>
+                  </a:txBody>
+                  <a:tcPr/>
+                </a:tc>
+                <a:tc>
+                  <a:txBody>
+                    <a:bodyPr/>
+                    <a:lstStyle/>
+                    <a:p>
+                      <a:r>
+                        <a:rPr lang="en-GB" dirty="0"/>
+                        <a:t>444 275</a:t>
+                      </a:r>
+                    </a:p>
+                  </a:txBody>
+                  <a:tcPr/>
+                </a:tc>
+                <a:tc>
+                  <a:txBody>
+                    <a:bodyPr/>
+                    <a:lstStyle/>
+                    <a:p>
+                      <a:r>
+                        <a:rPr lang="en-GB" dirty="0"/>
+                        <a:t>19 237</a:t>
+                      </a:r>
+                    </a:p>
+                  </a:txBody>
+                  <a:tcPr/>
+                </a:tc>
+                <a:tc>
+                  <a:txBody>
+                    <a:bodyPr/>
+                    <a:lstStyle/>
+                    <a:p>
+                      <a:r>
+                        <a:rPr lang="en-GB" dirty="0"/>
+                        <a:t>1138 (-48%)</a:t>
+                      </a:r>
+                    </a:p>
+                  </a:txBody>
+                  <a:tcPr/>
+                </a:tc>
+                <a:tc>
+                  <a:txBody>
+                    <a:bodyPr/>
+                    <a:lstStyle/>
+                    <a:p>
+                      <a:pPr marL="0" marR="0" lvl="0" indent="0" algn="l" defTabSz="914400" rtl="0" eaLnBrk="1" fontAlgn="auto" latinLnBrk="0" hangingPunct="1">
+                        <a:lnSpc>
+                          <a:spcPct val="100000"/>
+                        </a:lnSpc>
+                        <a:spcBef>
+                          <a:spcPts val="0"/>
+                        </a:spcBef>
+                        <a:spcAft>
+                          <a:spcPts val="0"/>
+                        </a:spcAft>
+                        <a:buClrTx/>
+                        <a:buSzTx/>
+                        <a:buFontTx/>
+                        <a:buNone/>
+                        <a:tabLst/>
+                        <a:defRPr/>
+                      </a:pPr>
+                      <a:r>
+                        <a:rPr lang="en-GB" dirty="0"/>
+                        <a:t>5 384 670</a:t>
+                      </a:r>
+                    </a:p>
+                  </a:txBody>
+                  <a:tcPr/>
+                </a:tc>
+                <a:tc>
+                  <a:txBody>
+                    <a:bodyPr/>
+                    <a:lstStyle/>
+                    <a:p>
+                      <a:r>
+                        <a:rPr lang="en-GB" dirty="0"/>
+                        <a:t>199 200</a:t>
+                      </a:r>
+                    </a:p>
+                  </a:txBody>
+                  <a:tcPr/>
+                </a:tc>
+                <a:tc>
+                  <a:txBody>
+                    <a:bodyPr/>
+                    <a:lstStyle/>
+                    <a:p>
+                      <a:r>
+                        <a:rPr lang="en-GB" dirty="0"/>
+                        <a:t>23 660 (-46.2%)</a:t>
+                      </a:r>
+                    </a:p>
+                  </a:txBody>
+                  <a:tcPr/>
+                </a:tc>
+                <a:extLst>
+                  <a:ext uri="{0D108BD9-81ED-4DB2-BD59-A6C34878D82A}">
+                    <a16:rowId xmlns:a16="http://schemas.microsoft.com/office/drawing/2014/main" val="984908913"/>
+                  </a:ext>
+                </a:extLst>
+              </a:tr>
+              <a:tr h="370840">
+                <a:tc>
+                  <a:txBody>
+                    <a:bodyPr/>
+                    <a:lstStyle/>
+                    <a:p>
+                      <a:r>
+                        <a:rPr lang="en-GB" dirty="0"/>
+                        <a:t>30%</a:t>
+                      </a:r>
+                    </a:p>
+                  </a:txBody>
+                  <a:tcPr/>
+                </a:tc>
+                <a:tc>
+                  <a:txBody>
+                    <a:bodyPr/>
+                    <a:lstStyle/>
+                    <a:p>
+                      <a:r>
+                        <a:rPr lang="en-GB" dirty="0"/>
+                        <a:t>87</a:t>
+                      </a:r>
+                    </a:p>
+                  </a:txBody>
+                  <a:tcPr/>
+                </a:tc>
+                <a:tc>
+                  <a:txBody>
+                    <a:bodyPr/>
+                    <a:lstStyle/>
+                    <a:p>
+                      <a:r>
+                        <a:rPr lang="en-GB" dirty="0"/>
+                        <a:t>438 246</a:t>
+                      </a:r>
+                    </a:p>
+                  </a:txBody>
+                  <a:tcPr/>
+                </a:tc>
+                <a:tc>
+                  <a:txBody>
+                    <a:bodyPr/>
+                    <a:lstStyle/>
+                    <a:p>
+                      <a:r>
+                        <a:rPr lang="en-GB" dirty="0"/>
+                        <a:t>25 266</a:t>
+                      </a:r>
+                    </a:p>
+                  </a:txBody>
+                  <a:tcPr/>
+                </a:tc>
+                <a:tc>
+                  <a:txBody>
+                    <a:bodyPr/>
+                    <a:lstStyle/>
+                    <a:p>
+                      <a:r>
+                        <a:rPr lang="en-GB" dirty="0"/>
+                        <a:t>872 (-60.2%)</a:t>
+                      </a:r>
+                    </a:p>
+                  </a:txBody>
+                  <a:tcPr/>
+                </a:tc>
+                <a:tc>
+                  <a:txBody>
+                    <a:bodyPr/>
+                    <a:lstStyle/>
+                    <a:p>
+                      <a:r>
+                        <a:rPr lang="en-GB" dirty="0"/>
+                        <a:t>5 317 040</a:t>
+                      </a:r>
+                    </a:p>
+                  </a:txBody>
+                  <a:tcPr/>
+                </a:tc>
+                <a:tc>
+                  <a:txBody>
+                    <a:bodyPr/>
+                    <a:lstStyle/>
+                    <a:p>
+                      <a:r>
+                        <a:rPr lang="en-GB" dirty="0"/>
+                        <a:t>266 830</a:t>
+                      </a:r>
+                    </a:p>
+                  </a:txBody>
+                  <a:tcPr/>
+                </a:tc>
+                <a:tc>
+                  <a:txBody>
+                    <a:bodyPr/>
+                    <a:lstStyle/>
+                    <a:p>
+                      <a:r>
+                        <a:rPr lang="en-GB" dirty="0"/>
+                        <a:t>17 596 (-60%)</a:t>
+                      </a:r>
+                    </a:p>
+                  </a:txBody>
+                  <a:tcPr/>
+                </a:tc>
+                <a:extLst>
+                  <a:ext uri="{0D108BD9-81ED-4DB2-BD59-A6C34878D82A}">
+                    <a16:rowId xmlns:a16="http://schemas.microsoft.com/office/drawing/2014/main" val="4287649469"/>
+                  </a:ext>
+                </a:extLst>
+              </a:tr>
+              <a:tr h="370840">
+                <a:tc>
+                  <a:txBody>
+                    <a:bodyPr/>
+                    <a:lstStyle/>
+                    <a:p>
+                      <a:r>
+                        <a:rPr lang="en-GB" dirty="0"/>
+                        <a:t>40%</a:t>
+                      </a:r>
+                    </a:p>
+                  </a:txBody>
+                  <a:tcPr/>
+                </a:tc>
+                <a:tc>
+                  <a:txBody>
+                    <a:bodyPr/>
+                    <a:lstStyle/>
+                    <a:p>
+                      <a:r>
+                        <a:rPr lang="en-GB" dirty="0"/>
+                        <a:t>97</a:t>
+                      </a:r>
+                    </a:p>
+                  </a:txBody>
+                  <a:tcPr/>
+                </a:tc>
+                <a:tc>
+                  <a:txBody>
+                    <a:bodyPr/>
+                    <a:lstStyle/>
+                    <a:p>
+                      <a:r>
+                        <a:rPr lang="en-GB" dirty="0"/>
+                        <a:t>433 593</a:t>
+                      </a:r>
+                    </a:p>
+                  </a:txBody>
+                  <a:tcPr/>
+                </a:tc>
+                <a:tc>
+                  <a:txBody>
+                    <a:bodyPr/>
+                    <a:lstStyle/>
+                    <a:p>
+                      <a:r>
+                        <a:rPr lang="en-GB" dirty="0"/>
+                        <a:t>29 919</a:t>
+                      </a:r>
+                    </a:p>
+                  </a:txBody>
+                  <a:tcPr/>
+                </a:tc>
+                <a:tc>
+                  <a:txBody>
+                    <a:bodyPr/>
+                    <a:lstStyle/>
+                    <a:p>
+                      <a:r>
+                        <a:rPr lang="en-GB" dirty="0"/>
+                        <a:t>689 (-68.5%)</a:t>
+                      </a:r>
+                    </a:p>
+                  </a:txBody>
+                  <a:tcPr/>
+                </a:tc>
+                <a:tc>
+                  <a:txBody>
+                    <a:bodyPr/>
+                    <a:lstStyle/>
+                    <a:p>
+                      <a:r>
+                        <a:rPr lang="en-GB" dirty="0"/>
+                        <a:t>5 262 790</a:t>
+                      </a:r>
+                    </a:p>
+                  </a:txBody>
+                  <a:tcPr/>
+                </a:tc>
+                <a:tc>
+                  <a:txBody>
+                    <a:bodyPr/>
+                    <a:lstStyle/>
+                    <a:p>
+                      <a:r>
+                        <a:rPr lang="en-GB" dirty="0"/>
+                        <a:t>321 080</a:t>
+                      </a:r>
+                    </a:p>
+                  </a:txBody>
+                  <a:tcPr/>
+                </a:tc>
+                <a:tc>
+                  <a:txBody>
+                    <a:bodyPr/>
+                    <a:lstStyle/>
+                    <a:p>
+                      <a:r>
+                        <a:rPr lang="en-GB" dirty="0"/>
+                        <a:t>13 053 (-70.3%)</a:t>
+                      </a:r>
+                    </a:p>
+                  </a:txBody>
+                  <a:tcPr/>
+                </a:tc>
+                <a:extLst>
+                  <a:ext uri="{0D108BD9-81ED-4DB2-BD59-A6C34878D82A}">
+                    <a16:rowId xmlns:a16="http://schemas.microsoft.com/office/drawing/2014/main" val="1527276395"/>
+                  </a:ext>
+                </a:extLst>
+              </a:tr>
+              <a:tr h="370840">
+                <a:tc>
+                  <a:txBody>
+                    <a:bodyPr/>
+                    <a:lstStyle/>
+                    <a:p>
+                      <a:r>
+                        <a:rPr lang="en-GB" dirty="0"/>
+                        <a:t>43%</a:t>
+                      </a:r>
+                    </a:p>
+                  </a:txBody>
+                  <a:tcPr/>
+                </a:tc>
+                <a:tc>
+                  <a:txBody>
+                    <a:bodyPr/>
+                    <a:lstStyle/>
+                    <a:p>
+                      <a:r>
+                        <a:rPr lang="en-GB" dirty="0"/>
+                        <a:t>100</a:t>
+                      </a:r>
+                    </a:p>
+                  </a:txBody>
+                  <a:tcPr/>
+                </a:tc>
+                <a:tc>
+                  <a:txBody>
+                    <a:bodyPr/>
+                    <a:lstStyle/>
+                    <a:p>
+                      <a:r>
+                        <a:rPr lang="en-GB" dirty="0"/>
+                        <a:t>432 401</a:t>
+                      </a:r>
+                    </a:p>
+                  </a:txBody>
+                  <a:tcPr/>
+                </a:tc>
+                <a:tc>
+                  <a:txBody>
+                    <a:bodyPr/>
+                    <a:lstStyle/>
+                    <a:p>
+                      <a:r>
+                        <a:rPr lang="en-GB" dirty="0"/>
+                        <a:t>31 111</a:t>
+                      </a:r>
+                    </a:p>
+                  </a:txBody>
+                  <a:tcPr/>
+                </a:tc>
+                <a:tc>
+                  <a:txBody>
+                    <a:bodyPr/>
+                    <a:lstStyle/>
+                    <a:p>
+                      <a:r>
+                        <a:rPr lang="en-GB" dirty="0"/>
+                        <a:t>646 (-70.5%)</a:t>
+                      </a:r>
+                    </a:p>
+                  </a:txBody>
+                  <a:tcPr/>
+                </a:tc>
+                <a:tc>
+                  <a:txBody>
+                    <a:bodyPr/>
+                    <a:lstStyle/>
+                    <a:p>
+                      <a:r>
+                        <a:rPr lang="en-GB" dirty="0"/>
+                        <a:t>5 248 570</a:t>
+                      </a:r>
+                    </a:p>
+                  </a:txBody>
+                  <a:tcPr/>
+                </a:tc>
+                <a:tc>
+                  <a:txBody>
+                    <a:bodyPr/>
+                    <a:lstStyle/>
+                    <a:p>
+                      <a:r>
+                        <a:rPr lang="en-GB" dirty="0"/>
+                        <a:t>335 300</a:t>
+                      </a:r>
+                    </a:p>
+                  </a:txBody>
+                  <a:tcPr/>
+                </a:tc>
+                <a:tc>
+                  <a:txBody>
+                    <a:bodyPr/>
+                    <a:lstStyle/>
+                    <a:p>
+                      <a:r>
+                        <a:rPr lang="en-GB" dirty="0"/>
+                        <a:t>11 910 (-72.9%)</a:t>
+                      </a:r>
+                    </a:p>
+                  </a:txBody>
+                  <a:tcPr/>
+                </a:tc>
+                <a:extLst>
+                  <a:ext uri="{0D108BD9-81ED-4DB2-BD59-A6C34878D82A}">
+                    <a16:rowId xmlns:a16="http://schemas.microsoft.com/office/drawing/2014/main" val="1427534928"/>
+                  </a:ext>
+                </a:extLst>
+              </a:tr>
+            </a:tbl>
+          </a:graphicData>
+        </a:graphic>
+      </p:graphicFrame>
+    </p:spTree>
+    <p:extLst>
+      <p:ext uri="{BB962C8B-B14F-4D97-AF65-F5344CB8AC3E}">
+        <p14:creationId xmlns:p14="http://schemas.microsoft.com/office/powerpoint/2010/main" val="3066162972"/>
+      </p:ext>
+    </p:extLst>
+  </p:cSld>
+  <p:clrMapOvr>
+    <a:masterClrMapping/>
+  </p:clrMapOvr>
+</p:sld>
+</file>
+
+<file path=ppt/slides/slide13.xml><?xml version="1.0" encoding="utf-8"?>
+<p:sld xmlns:a="http://schemas.openxmlformats.org/drawingml/2006/main" xmlns:r="http://schemas.openxmlformats.org/officeDocument/2006/relationships" xmlns:p="http://schemas.openxmlformats.org/presentationml/2006/main">
+  <p:cSld>
+    <p:spTree>
+      <p:nvGrpSpPr>
+        <p:cNvPr id="1" name=""/>
+        <p:cNvGrpSpPr/>
+        <p:nvPr/>
+      </p:nvGrpSpPr>
+      <p:grpSpPr>
+        <a:xfrm>
+          <a:off x="0" y="0"/>
+          <a:ext cx="0" cy="0"/>
+          <a:chOff x="0" y="0"/>
+          <a:chExt cx="0" cy="0"/>
+        </a:xfrm>
+      </p:grpSpPr>
+      <p:sp>
+        <p:nvSpPr>
+          <p:cNvPr id="2" name="Title 1">
+            <a:extLst>
+              <a:ext uri="{FF2B5EF4-FFF2-40B4-BE49-F238E27FC236}">
+                <a16:creationId xmlns:a16="http://schemas.microsoft.com/office/drawing/2014/main" id="{F03BF685-9974-0851-5030-9731672431B8}"/>
+              </a:ext>
+            </a:extLst>
+          </p:cNvPr>
+          <p:cNvSpPr>
+            <a:spLocks noGrp="1"/>
+          </p:cNvSpPr>
+          <p:nvPr>
+            <p:ph type="title"/>
+          </p:nvPr>
+        </p:nvSpPr>
+        <p:spPr>
+          <a:xfrm>
+            <a:off x="838200" y="365125"/>
+            <a:ext cx="10515600" cy="685199"/>
+          </a:xfrm>
+        </p:spPr>
+        <p:txBody>
+          <a:bodyPr>
+            <a:normAutofit fontScale="90000"/>
+          </a:bodyPr>
+          <a:lstStyle/>
+          <a:p>
+            <a:r>
+              <a:rPr lang="en-GB" dirty="0"/>
+              <a:t>Exp1: Increasing case detection rates</a:t>
+            </a:r>
+          </a:p>
+        </p:txBody>
+      </p:sp>
+      <p:pic>
+        <p:nvPicPr>
+          <p:cNvPr id="7" name="Picture 6">
+            <a:extLst>
+              <a:ext uri="{FF2B5EF4-FFF2-40B4-BE49-F238E27FC236}">
+                <a16:creationId xmlns:a16="http://schemas.microsoft.com/office/drawing/2014/main" id="{E5556C5D-6F00-A9B5-1A12-720B26993C35}"/>
+              </a:ext>
+            </a:extLst>
+          </p:cNvPr>
+          <p:cNvPicPr>
+            <a:picLocks noChangeAspect="1"/>
+          </p:cNvPicPr>
+          <p:nvPr/>
+        </p:nvPicPr>
+        <p:blipFill>
+          <a:blip r:embed="rId3"/>
+          <a:stretch>
+            <a:fillRect/>
+          </a:stretch>
+        </p:blipFill>
+        <p:spPr>
+          <a:xfrm>
+            <a:off x="181428" y="1162957"/>
+            <a:ext cx="5449606" cy="2668814"/>
+          </a:xfrm>
+          <a:prstGeom prst="rect">
+            <a:avLst/>
+          </a:prstGeom>
+        </p:spPr>
+      </p:pic>
+      <p:pic>
+        <p:nvPicPr>
+          <p:cNvPr id="8" name="Picture 7">
+            <a:extLst>
+              <a:ext uri="{FF2B5EF4-FFF2-40B4-BE49-F238E27FC236}">
+                <a16:creationId xmlns:a16="http://schemas.microsoft.com/office/drawing/2014/main" id="{89575E5E-6AE8-0506-A188-9AA71F80D1CF}"/>
+              </a:ext>
+            </a:extLst>
+          </p:cNvPr>
+          <p:cNvPicPr>
+            <a:picLocks noChangeAspect="1"/>
+          </p:cNvPicPr>
+          <p:nvPr/>
+        </p:nvPicPr>
+        <p:blipFill>
+          <a:blip r:embed="rId4"/>
+          <a:srcRect/>
+          <a:stretch/>
+        </p:blipFill>
+        <p:spPr>
+          <a:xfrm>
+            <a:off x="181428" y="3976245"/>
+            <a:ext cx="5449606" cy="2605132"/>
+          </a:xfrm>
+          <a:prstGeom prst="rect">
+            <a:avLst/>
+          </a:prstGeom>
+        </p:spPr>
+      </p:pic>
+      <p:pic>
+        <p:nvPicPr>
+          <p:cNvPr id="9" name="Picture 8">
+            <a:extLst>
+              <a:ext uri="{FF2B5EF4-FFF2-40B4-BE49-F238E27FC236}">
+                <a16:creationId xmlns:a16="http://schemas.microsoft.com/office/drawing/2014/main" id="{EEA811CB-5E86-E7AE-80BD-4BBC546F663F}"/>
+              </a:ext>
+            </a:extLst>
+          </p:cNvPr>
+          <p:cNvPicPr>
+            <a:picLocks noChangeAspect="1"/>
+          </p:cNvPicPr>
+          <p:nvPr/>
+        </p:nvPicPr>
+        <p:blipFill>
+          <a:blip r:embed="rId5"/>
+          <a:stretch>
+            <a:fillRect/>
+          </a:stretch>
+        </p:blipFill>
+        <p:spPr>
+          <a:xfrm>
+            <a:off x="5825671" y="1121400"/>
+            <a:ext cx="5742215" cy="2717469"/>
+          </a:xfrm>
+          <a:prstGeom prst="rect">
+            <a:avLst/>
+          </a:prstGeom>
+        </p:spPr>
+      </p:pic>
+      <p:pic>
+        <p:nvPicPr>
+          <p:cNvPr id="10" name="Picture 9">
+            <a:extLst>
+              <a:ext uri="{FF2B5EF4-FFF2-40B4-BE49-F238E27FC236}">
+                <a16:creationId xmlns:a16="http://schemas.microsoft.com/office/drawing/2014/main" id="{2DB30842-27A3-03E7-9D17-4F9BD3A4CDFB}"/>
+              </a:ext>
+            </a:extLst>
+          </p:cNvPr>
+          <p:cNvPicPr>
+            <a:picLocks noChangeAspect="1"/>
+          </p:cNvPicPr>
+          <p:nvPr/>
+        </p:nvPicPr>
+        <p:blipFill>
+          <a:blip r:embed="rId6"/>
+          <a:stretch>
+            <a:fillRect/>
+          </a:stretch>
+        </p:blipFill>
+        <p:spPr>
+          <a:xfrm>
+            <a:off x="5825670" y="3976244"/>
+            <a:ext cx="5742215" cy="2605132"/>
+          </a:xfrm>
+          <a:prstGeom prst="rect">
+            <a:avLst/>
+          </a:prstGeom>
+        </p:spPr>
+      </p:pic>
+    </p:spTree>
+    <p:extLst>
+      <p:ext uri="{BB962C8B-B14F-4D97-AF65-F5344CB8AC3E}">
+        <p14:creationId xmlns:p14="http://schemas.microsoft.com/office/powerpoint/2010/main" val="302917396"/>
       </p:ext>
     </p:extLst>
   </p:cSld>
@@ -4870,4 +7174,319 @@
     </a:ext>
   </a:extLst>
 </a:theme>
+</file>
+
+<file path=ppt/theme/theme2.xml><?xml version="1.0" encoding="utf-8"?>
+<a:theme xmlns:a="http://schemas.openxmlformats.org/drawingml/2006/main" name="Office Theme">
+  <a:themeElements>
+    <a:clrScheme name="Office">
+      <a:dk1>
+        <a:sysClr val="windowText" lastClr="000000"/>
+      </a:dk1>
+      <a:lt1>
+        <a:sysClr val="window" lastClr="FFFFFF"/>
+      </a:lt1>
+      <a:dk2>
+        <a:srgbClr val="0E2841"/>
+      </a:dk2>
+      <a:lt2>
+        <a:srgbClr val="E8E8E8"/>
+      </a:lt2>
+      <a:accent1>
+        <a:srgbClr val="156082"/>
+      </a:accent1>
+      <a:accent2>
+        <a:srgbClr val="E97132"/>
+      </a:accent2>
+      <a:accent3>
+        <a:srgbClr val="196B24"/>
+      </a:accent3>
+      <a:accent4>
+        <a:srgbClr val="0F9ED5"/>
+      </a:accent4>
+      <a:accent5>
+        <a:srgbClr val="A02B93"/>
+      </a:accent5>
+      <a:accent6>
+        <a:srgbClr val="4EA72E"/>
+      </a:accent6>
+      <a:hlink>
+        <a:srgbClr val="467886"/>
+      </a:hlink>
+      <a:folHlink>
+        <a:srgbClr val="96607D"/>
+      </a:folHlink>
+    </a:clrScheme>
+    <a:fontScheme name="Office">
+      <a:majorFont>
+        <a:latin typeface="Aptos Display" panose="02110004020202020204"/>
+        <a:ea typeface=""/>
+        <a:cs typeface=""/>
+        <a:font script="Jpan" typeface="游ゴシック Light"/>
+        <a:font script="Hang" typeface="맑은 고딕"/>
+        <a:font script="Hans" typeface="等线 Light"/>
+        <a:font script="Hant" typeface="新細明體"/>
+        <a:font script="Arab" typeface="Times New Roman"/>
+        <a:font script="Hebr" typeface="Times New Roman"/>
+        <a:font script="Thai" typeface="Angsana New"/>
+        <a:font script="Ethi" typeface="Nyala"/>
+        <a:font script="Beng" typeface="Vrinda"/>
+        <a:font script="Gujr" typeface="Shruti"/>
+        <a:font script="Khmr" typeface="MoolBoran"/>
+        <a:font script="Knda" typeface="Tunga"/>
+        <a:font script="Guru" typeface="Raavi"/>
+        <a:font script="Cans" typeface="Euphemia"/>
+        <a:font script="Cher" typeface="Plantagenet Cherokee"/>
+        <a:font script="Yiii" typeface="Microsoft Yi Baiti"/>
+        <a:font script="Tibt" typeface="Microsoft Himalaya"/>
+        <a:font script="Thaa" typeface="MV Boli"/>
+        <a:font script="Deva" typeface="Mangal"/>
+        <a:font script="Telu" typeface="Gautami"/>
+        <a:font script="Taml" typeface="Latha"/>
+        <a:font script="Syrc" typeface="Estrangelo Edessa"/>
+        <a:font script="Orya" typeface="Kalinga"/>
+        <a:font script="Mlym" typeface="Kartika"/>
+        <a:font script="Laoo" typeface="DokChampa"/>
+        <a:font script="Sinh" typeface="Iskoola Pota"/>
+        <a:font script="Mong" typeface="Mongolian Baiti"/>
+        <a:font script="Viet" typeface="Times New Roman"/>
+        <a:font script="Uigh" typeface="Microsoft Uighur"/>
+        <a:font script="Geor" typeface="Sylfaen"/>
+        <a:font script="Armn" typeface="Arial"/>
+        <a:font script="Bugi" typeface="Leelawadee UI"/>
+        <a:font script="Bopo" typeface="Microsoft JhengHei"/>
+        <a:font script="Java" typeface="Javanese Text"/>
+        <a:font script="Lisu" typeface="Segoe UI"/>
+        <a:font script="Mymr" typeface="Myanmar Text"/>
+        <a:font script="Nkoo" typeface="Ebrima"/>
+        <a:font script="Olck" typeface="Nirmala UI"/>
+        <a:font script="Osma" typeface="Ebrima"/>
+        <a:font script="Phag" typeface="Phagspa"/>
+        <a:font script="Syrn" typeface="Estrangelo Edessa"/>
+        <a:font script="Syrj" typeface="Estrangelo Edessa"/>
+        <a:font script="Syre" typeface="Estrangelo Edessa"/>
+        <a:font script="Sora" typeface="Nirmala UI"/>
+        <a:font script="Tale" typeface="Microsoft Tai Le"/>
+        <a:font script="Talu" typeface="Microsoft New Tai Lue"/>
+        <a:font script="Tfng" typeface="Ebrima"/>
+      </a:majorFont>
+      <a:minorFont>
+        <a:latin typeface="Aptos" panose="02110004020202020204"/>
+        <a:ea typeface=""/>
+        <a:cs typeface=""/>
+        <a:font script="Jpan" typeface="游ゴシック"/>
+        <a:font script="Hang" typeface="맑은 고딕"/>
+        <a:font script="Hans" typeface="等线"/>
+        <a:font script="Hant" typeface="新細明體"/>
+        <a:font script="Arab" typeface="Arial"/>
+        <a:font script="Hebr" typeface="Arial"/>
+        <a:font script="Thai" typeface="Cordia New"/>
+        <a:font script="Ethi" typeface="Nyala"/>
+        <a:font script="Beng" typeface="Vrinda"/>
+        <a:font script="Gujr" typeface="Shruti"/>
+        <a:font script="Khmr" typeface="DaunPenh"/>
+        <a:font script="Knda" typeface="Tunga"/>
+        <a:font script="Guru" typeface="Raavi"/>
+        <a:font script="Cans" typeface="Euphemia"/>
+        <a:font script="Cher" typeface="Plantagenet Cherokee"/>
+        <a:font script="Yiii" typeface="Microsoft Yi Baiti"/>
+        <a:font script="Tibt" typeface="Microsoft Himalaya"/>
+        <a:font script="Thaa" typeface="MV Boli"/>
+        <a:font script="Deva" typeface="Mangal"/>
+        <a:font script="Telu" typeface="Gautami"/>
+        <a:font script="Taml" typeface="Latha"/>
+        <a:font script="Syrc" typeface="Estrangelo Edessa"/>
+        <a:font script="Orya" typeface="Kalinga"/>
+        <a:font script="Mlym" typeface="Kartika"/>
+        <a:font script="Laoo" typeface="DokChampa"/>
+        <a:font script="Sinh" typeface="Iskoola Pota"/>
+        <a:font script="Mong" typeface="Mongolian Baiti"/>
+        <a:font script="Viet" typeface="Arial"/>
+        <a:font script="Uigh" typeface="Microsoft Uighur"/>
+        <a:font script="Geor" typeface="Sylfaen"/>
+        <a:font script="Armn" typeface="Arial"/>
+        <a:font script="Bugi" typeface="Leelawadee UI"/>
+        <a:font script="Bopo" typeface="Microsoft JhengHei"/>
+        <a:font script="Java" typeface="Javanese Text"/>
+        <a:font script="Lisu" typeface="Segoe UI"/>
+        <a:font script="Mymr" typeface="Myanmar Text"/>
+        <a:font script="Nkoo" typeface="Ebrima"/>
+        <a:font script="Olck" typeface="Nirmala UI"/>
+        <a:font script="Osma" typeface="Ebrima"/>
+        <a:font script="Phag" typeface="Phagspa"/>
+        <a:font script="Syrn" typeface="Estrangelo Edessa"/>
+        <a:font script="Syrj" typeface="Estrangelo Edessa"/>
+        <a:font script="Syre" typeface="Estrangelo Edessa"/>
+        <a:font script="Sora" typeface="Nirmala UI"/>
+        <a:font script="Tale" typeface="Microsoft Tai Le"/>
+        <a:font script="Talu" typeface="Microsoft New Tai Lue"/>
+        <a:font script="Tfng" typeface="Ebrima"/>
+      </a:minorFont>
+    </a:fontScheme>
+    <a:fmtScheme name="Office">
+      <a:fillStyleLst>
+        <a:solidFill>
+          <a:schemeClr val="phClr"/>
+        </a:solidFill>
+        <a:gradFill rotWithShape="1">
+          <a:gsLst>
+            <a:gs pos="0">
+              <a:schemeClr val="phClr">
+                <a:lumMod val="110000"/>
+                <a:satMod val="105000"/>
+                <a:tint val="67000"/>
+              </a:schemeClr>
+            </a:gs>
+            <a:gs pos="50000">
+              <a:schemeClr val="phClr">
+                <a:lumMod val="105000"/>
+                <a:satMod val="103000"/>
+                <a:tint val="73000"/>
+              </a:schemeClr>
+            </a:gs>
+            <a:gs pos="100000">
+              <a:schemeClr val="phClr">
+                <a:lumMod val="105000"/>
+                <a:satMod val="109000"/>
+                <a:tint val="81000"/>
+              </a:schemeClr>
+            </a:gs>
+          </a:gsLst>
+          <a:lin ang="5400000" scaled="0"/>
+        </a:gradFill>
+        <a:gradFill rotWithShape="1">
+          <a:gsLst>
+            <a:gs pos="0">
+              <a:schemeClr val="phClr">
+                <a:satMod val="103000"/>
+                <a:lumMod val="102000"/>
+                <a:tint val="94000"/>
+              </a:schemeClr>
+            </a:gs>
+            <a:gs pos="50000">
+              <a:schemeClr val="phClr">
+                <a:satMod val="110000"/>
+                <a:lumMod val="100000"/>
+                <a:shade val="100000"/>
+              </a:schemeClr>
+            </a:gs>
+            <a:gs pos="100000">
+              <a:schemeClr val="phClr">
+                <a:lumMod val="99000"/>
+                <a:satMod val="120000"/>
+                <a:shade val="78000"/>
+              </a:schemeClr>
+            </a:gs>
+          </a:gsLst>
+          <a:lin ang="5400000" scaled="0"/>
+        </a:gradFill>
+      </a:fillStyleLst>
+      <a:lnStyleLst>
+        <a:ln w="12700" cap="flat" cmpd="sng" algn="ctr">
+          <a:solidFill>
+            <a:schemeClr val="phClr"/>
+          </a:solidFill>
+          <a:prstDash val="solid"/>
+          <a:miter lim="800000"/>
+        </a:ln>
+        <a:ln w="19050" cap="flat" cmpd="sng" algn="ctr">
+          <a:solidFill>
+            <a:schemeClr val="phClr"/>
+          </a:solidFill>
+          <a:prstDash val="solid"/>
+          <a:miter lim="800000"/>
+        </a:ln>
+        <a:ln w="25400" cap="flat" cmpd="sng" algn="ctr">
+          <a:solidFill>
+            <a:schemeClr val="phClr"/>
+          </a:solidFill>
+          <a:prstDash val="solid"/>
+          <a:miter lim="800000"/>
+        </a:ln>
+      </a:lnStyleLst>
+      <a:effectStyleLst>
+        <a:effectStyle>
+          <a:effectLst/>
+        </a:effectStyle>
+        <a:effectStyle>
+          <a:effectLst/>
+        </a:effectStyle>
+        <a:effectStyle>
+          <a:effectLst>
+            <a:outerShdw blurRad="57150" dist="19050" dir="5400000" algn="ctr" rotWithShape="0">
+              <a:srgbClr val="000000">
+                <a:alpha val="63000"/>
+              </a:srgbClr>
+            </a:outerShdw>
+          </a:effectLst>
+        </a:effectStyle>
+      </a:effectStyleLst>
+      <a:bgFillStyleLst>
+        <a:solidFill>
+          <a:schemeClr val="phClr"/>
+        </a:solidFill>
+        <a:solidFill>
+          <a:schemeClr val="phClr">
+            <a:tint val="95000"/>
+            <a:satMod val="170000"/>
+          </a:schemeClr>
+        </a:solidFill>
+        <a:gradFill rotWithShape="1">
+          <a:gsLst>
+            <a:gs pos="0">
+              <a:schemeClr val="phClr">
+                <a:tint val="93000"/>
+                <a:satMod val="150000"/>
+                <a:shade val="98000"/>
+                <a:lumMod val="102000"/>
+              </a:schemeClr>
+            </a:gs>
+            <a:gs pos="50000">
+              <a:schemeClr val="phClr">
+                <a:tint val="98000"/>
+                <a:satMod val="130000"/>
+                <a:shade val="90000"/>
+                <a:lumMod val="103000"/>
+              </a:schemeClr>
+            </a:gs>
+            <a:gs pos="100000">
+              <a:schemeClr val="phClr">
+                <a:shade val="63000"/>
+                <a:satMod val="120000"/>
+              </a:schemeClr>
+            </a:gs>
+          </a:gsLst>
+          <a:lin ang="5400000" scaled="0"/>
+        </a:gradFill>
+      </a:bgFillStyleLst>
+    </a:fmtScheme>
+  </a:themeElements>
+  <a:objectDefaults>
+    <a:lnDef>
+      <a:spPr/>
+      <a:bodyPr/>
+      <a:lstStyle/>
+      <a:style>
+        <a:lnRef idx="2">
+          <a:schemeClr val="accent1"/>
+        </a:lnRef>
+        <a:fillRef idx="0">
+          <a:schemeClr val="accent1"/>
+        </a:fillRef>
+        <a:effectRef idx="1">
+          <a:schemeClr val="accent1"/>
+        </a:effectRef>
+        <a:fontRef idx="minor">
+          <a:schemeClr val="tx1"/>
+        </a:fontRef>
+      </a:style>
+    </a:lnDef>
+  </a:objectDefaults>
+  <a:extraClrSchemeLst/>
+  <a:extLst>
+    <a:ext uri="{05A4C25C-085E-4340-85A3-A5531E510DB2}">
+      <thm15:themeFamily xmlns:thm15="http://schemas.microsoft.com/office/thememl/2012/main" name="Office Theme" id="{2E142A2C-CD16-42D6-873A-C26D2A0506FA}" vid="{1BDDFF52-6CD6-40A5-AB3C-68EB2F1E4D0A}"/>
+    </a:ext>
+  </a:extLst>
+</a:theme>
 </file>
</xml_diff>

<commit_message>
Static scenario analysis - cascade plots
</commit_message>
<xml_diff>
--- a/documentation/interim/Transmission Model Baseline.pptx
+++ b/documentation/interim/Transmission Model Baseline.pptx
@@ -128,6 +128,43 @@
 </p:presentation>
 </file>
 
+<file path=ppt/revisionInfo.xml><?xml version="1.0" encoding="utf-8"?>
+<p1510:revInfo xmlns:a="http://schemas.openxmlformats.org/drawingml/2006/main" xmlns:r="http://schemas.openxmlformats.org/officeDocument/2006/relationships" xmlns:p1510="http://schemas.microsoft.com/office/powerpoint/2015/10/main">
+  <p1510:revLst>
+    <p1510:client id="{650BDC14-C08A-4D47-B928-7279BE3EFB03}" v="1" dt="2024-05-03T12:38:41.720"/>
+  </p1510:revLst>
+</p1510:revInfo>
+</file>
+
+<file path=ppt/changesInfos/changesInfo1.xml><?xml version="1.0" encoding="utf-8"?>
+<pc:chgInfo xmlns:a="http://schemas.openxmlformats.org/drawingml/2006/main" xmlns:r="http://schemas.openxmlformats.org/officeDocument/2006/relationships" xmlns:ac="http://schemas.microsoft.com/office/drawing/2013/main/command" xmlns:pc="http://schemas.microsoft.com/office/powerpoint/2013/main/command">
+  <pc:docChgLst>
+    <pc:chgData name="Alex de Nooy" userId="2ae90f5cbd0fd171" providerId="LiveId" clId="{650BDC14-C08A-4D47-B928-7279BE3EFB03}"/>
+    <pc:docChg chg="custSel modSld">
+      <pc:chgData name="Alex de Nooy" userId="2ae90f5cbd0fd171" providerId="LiveId" clId="{650BDC14-C08A-4D47-B928-7279BE3EFB03}" dt="2024-05-03T12:38:49.924" v="12" actId="14100"/>
+      <pc:docMkLst>
+        <pc:docMk/>
+      </pc:docMkLst>
+      <pc:sldChg chg="addSp modSp mod">
+        <pc:chgData name="Alex de Nooy" userId="2ae90f5cbd0fd171" providerId="LiveId" clId="{650BDC14-C08A-4D47-B928-7279BE3EFB03}" dt="2024-05-03T12:38:49.924" v="12" actId="14100"/>
+        <pc:sldMkLst>
+          <pc:docMk/>
+          <pc:sldMk cId="302917396" sldId="268"/>
+        </pc:sldMkLst>
+        <pc:spChg chg="add mod">
+          <ac:chgData name="Alex de Nooy" userId="2ae90f5cbd0fd171" providerId="LiveId" clId="{650BDC14-C08A-4D47-B928-7279BE3EFB03}" dt="2024-05-03T12:38:49.924" v="12" actId="14100"/>
+          <ac:spMkLst>
+            <pc:docMk/>
+            <pc:sldMk cId="302917396" sldId="268"/>
+            <ac:spMk id="3" creationId="{A790E9C1-92A1-CA03-C6F9-0ECABC214560}"/>
+          </ac:spMkLst>
+        </pc:spChg>
+      </pc:sldChg>
+    </pc:docChg>
+  </pc:docChgLst>
+</pc:chgInfo>
+</file>
+
 <file path=ppt/notesMasters/notesMaster1.xml><?xml version="1.0" encoding="utf-8"?>
 <p:notesMaster xmlns:a="http://schemas.openxmlformats.org/drawingml/2006/main" xmlns:r="http://schemas.openxmlformats.org/officeDocument/2006/relationships" xmlns:p="http://schemas.openxmlformats.org/presentationml/2006/main">
   <p:cSld>
@@ -210,7 +247,7 @@
           <a:p>
             <a:fld id="{57FFCFAA-812D-1847-A5BB-105B73839FDE}" type="datetimeFigureOut">
               <a:rPr lang="en-GB" smtClean="0"/>
-              <a:t>01/05/2024</a:t>
+              <a:t>03/05/2024</a:t>
             </a:fld>
             <a:endParaRPr lang="en-GB"/>
           </a:p>
@@ -876,7 +913,7 @@
           <a:p>
             <a:fld id="{08C1035D-8CA6-4748-93CD-5DDB1972CCBE}" type="datetimeFigureOut">
               <a:rPr lang="en-GB" smtClean="0"/>
-              <a:t>01/05/2024</a:t>
+              <a:t>03/05/2024</a:t>
             </a:fld>
             <a:endParaRPr lang="en-GB"/>
           </a:p>
@@ -1074,7 +1111,7 @@
           <a:p>
             <a:fld id="{08C1035D-8CA6-4748-93CD-5DDB1972CCBE}" type="datetimeFigureOut">
               <a:rPr lang="en-GB" smtClean="0"/>
-              <a:t>01/05/2024</a:t>
+              <a:t>03/05/2024</a:t>
             </a:fld>
             <a:endParaRPr lang="en-GB"/>
           </a:p>
@@ -1282,7 +1319,7 @@
           <a:p>
             <a:fld id="{08C1035D-8CA6-4748-93CD-5DDB1972CCBE}" type="datetimeFigureOut">
               <a:rPr lang="en-GB" smtClean="0"/>
-              <a:t>01/05/2024</a:t>
+              <a:t>03/05/2024</a:t>
             </a:fld>
             <a:endParaRPr lang="en-GB"/>
           </a:p>
@@ -1480,7 +1517,7 @@
           <a:p>
             <a:fld id="{08C1035D-8CA6-4748-93CD-5DDB1972CCBE}" type="datetimeFigureOut">
               <a:rPr lang="en-GB" smtClean="0"/>
-              <a:t>01/05/2024</a:t>
+              <a:t>03/05/2024</a:t>
             </a:fld>
             <a:endParaRPr lang="en-GB"/>
           </a:p>
@@ -1755,7 +1792,7 @@
           <a:p>
             <a:fld id="{08C1035D-8CA6-4748-93CD-5DDB1972CCBE}" type="datetimeFigureOut">
               <a:rPr lang="en-GB" smtClean="0"/>
-              <a:t>01/05/2024</a:t>
+              <a:t>03/05/2024</a:t>
             </a:fld>
             <a:endParaRPr lang="en-GB"/>
           </a:p>
@@ -2020,7 +2057,7 @@
           <a:p>
             <a:fld id="{08C1035D-8CA6-4748-93CD-5DDB1972CCBE}" type="datetimeFigureOut">
               <a:rPr lang="en-GB" smtClean="0"/>
-              <a:t>01/05/2024</a:t>
+              <a:t>03/05/2024</a:t>
             </a:fld>
             <a:endParaRPr lang="en-GB"/>
           </a:p>
@@ -2432,7 +2469,7 @@
           <a:p>
             <a:fld id="{08C1035D-8CA6-4748-93CD-5DDB1972CCBE}" type="datetimeFigureOut">
               <a:rPr lang="en-GB" smtClean="0"/>
-              <a:t>01/05/2024</a:t>
+              <a:t>03/05/2024</a:t>
             </a:fld>
             <a:endParaRPr lang="en-GB"/>
           </a:p>
@@ -2573,7 +2610,7 @@
           <a:p>
             <a:fld id="{08C1035D-8CA6-4748-93CD-5DDB1972CCBE}" type="datetimeFigureOut">
               <a:rPr lang="en-GB" smtClean="0"/>
-              <a:t>01/05/2024</a:t>
+              <a:t>03/05/2024</a:t>
             </a:fld>
             <a:endParaRPr lang="en-GB"/>
           </a:p>
@@ -2686,7 +2723,7 @@
           <a:p>
             <a:fld id="{08C1035D-8CA6-4748-93CD-5DDB1972CCBE}" type="datetimeFigureOut">
               <a:rPr lang="en-GB" smtClean="0"/>
-              <a:t>01/05/2024</a:t>
+              <a:t>03/05/2024</a:t>
             </a:fld>
             <a:endParaRPr lang="en-GB"/>
           </a:p>
@@ -2997,7 +3034,7 @@
           <a:p>
             <a:fld id="{08C1035D-8CA6-4748-93CD-5DDB1972CCBE}" type="datetimeFigureOut">
               <a:rPr lang="en-GB" smtClean="0"/>
-              <a:t>01/05/2024</a:t>
+              <a:t>03/05/2024</a:t>
             </a:fld>
             <a:endParaRPr lang="en-GB"/>
           </a:p>
@@ -3285,7 +3322,7 @@
           <a:p>
             <a:fld id="{08C1035D-8CA6-4748-93CD-5DDB1972CCBE}" type="datetimeFigureOut">
               <a:rPr lang="en-GB" smtClean="0"/>
-              <a:t>01/05/2024</a:t>
+              <a:t>03/05/2024</a:t>
             </a:fld>
             <a:endParaRPr lang="en-GB"/>
           </a:p>
@@ -3526,7 +3563,7 @@
           <a:p>
             <a:fld id="{08C1035D-8CA6-4748-93CD-5DDB1972CCBE}" type="datetimeFigureOut">
               <a:rPr lang="en-GB" smtClean="0"/>
-              <a:t>01/05/2024</a:t>
+              <a:t>03/05/2024</a:t>
             </a:fld>
             <a:endParaRPr lang="en-GB"/>
           </a:p>
@@ -5879,6 +5916,41 @@
           </a:prstGeom>
         </p:spPr>
       </p:pic>
+      <p:sp>
+        <p:nvSpPr>
+          <p:cNvPr id="3" name="TextBox 2">
+            <a:extLst>
+              <a:ext uri="{FF2B5EF4-FFF2-40B4-BE49-F238E27FC236}">
+                <a16:creationId xmlns:a16="http://schemas.microsoft.com/office/drawing/2014/main" id="{A790E9C1-92A1-CA03-C6F9-0ECABC214560}"/>
+              </a:ext>
+            </a:extLst>
+          </p:cNvPr>
+          <p:cNvSpPr txBox="1"/>
+          <p:nvPr/>
+        </p:nvSpPr>
+        <p:spPr>
+          <a:xfrm>
+            <a:off x="9038493" y="180459"/>
+            <a:ext cx="1348153" cy="369332"/>
+          </a:xfrm>
+          <a:prstGeom prst="rect">
+            <a:avLst/>
+          </a:prstGeom>
+          <a:noFill/>
+        </p:spPr>
+        <p:txBody>
+          <a:bodyPr wrap="square" rtlCol="0">
+            <a:spAutoFit/>
+          </a:bodyPr>
+          <a:lstStyle/>
+          <a:p>
+            <a:r>
+              <a:rPr lang="en-GB" dirty="0"/>
+              <a:t>Scale-up?</a:t>
+            </a:r>
+          </a:p>
+        </p:txBody>
+      </p:sp>
     </p:spTree>
     <p:extLst>
       <p:ext uri="{BB962C8B-B14F-4D97-AF65-F5344CB8AC3E}">

</xml_diff>